<commit_message>
Alteração no trabalho, coloquei os arquivos de pesquisa em uma pasta
</commit_message>
<xml_diff>
--- a/Seminário VxWorks.pptx
+++ b/Seminário VxWorks.pptx
@@ -17,8 +17,10 @@
     <p:sldId id="265" r:id="rId11"/>
     <p:sldId id="266" r:id="rId12"/>
     <p:sldId id="267" r:id="rId13"/>
-    <p:sldId id="268" r:id="rId14"/>
-    <p:sldId id="269" r:id="rId15"/>
+    <p:sldId id="269" r:id="rId14"/>
+    <p:sldId id="268" r:id="rId15"/>
+    <p:sldId id="270" r:id="rId16"/>
+    <p:sldId id="271" r:id="rId17"/>
   </p:sldIdLst>
   <p:sldSz cx="12192000" cy="6858000"/>
   <p:notesSz cx="6858000" cy="9144000"/>
@@ -117,6 +119,11 @@
       </a:defRPr>
     </a:lvl9pPr>
   </p:defaultTextStyle>
+  <p:extLst>
+    <p:ext uri="{EFAFB233-063F-42B5-8137-9DF3F51BA10A}">
+      <p15:sldGuideLst xmlns:p15="http://schemas.microsoft.com/office/powerpoint/2012/main"/>
+    </p:ext>
+  </p:extLst>
 </p:presentation>
 </file>
 
@@ -865,7 +872,7 @@
           <a:p>
             <a:fld id="{BBB81D1D-6B13-495D-83C2-9E772D59B649}" type="datetimeFigureOut">
               <a:rPr lang="pt-BR" smtClean="0"/>
-              <a:t>01/04/2017</a:t>
+              <a:t>04/04/2017</a:t>
             </a:fld>
             <a:endParaRPr lang="pt-BR"/>
           </a:p>
@@ -1116,7 +1123,7 @@
           <a:p>
             <a:fld id="{BBB81D1D-6B13-495D-83C2-9E772D59B649}" type="datetimeFigureOut">
               <a:rPr lang="pt-BR" smtClean="0"/>
-              <a:t>01/04/2017</a:t>
+              <a:t>04/04/2017</a:t>
             </a:fld>
             <a:endParaRPr lang="pt-BR"/>
           </a:p>
@@ -1430,7 +1437,7 @@
           <a:p>
             <a:fld id="{BBB81D1D-6B13-495D-83C2-9E772D59B649}" type="datetimeFigureOut">
               <a:rPr lang="pt-BR" smtClean="0"/>
-              <a:t>01/04/2017</a:t>
+              <a:t>04/04/2017</a:t>
             </a:fld>
             <a:endParaRPr lang="pt-BR"/>
           </a:p>
@@ -1763,7 +1770,7 @@
           <a:p>
             <a:fld id="{BBB81D1D-6B13-495D-83C2-9E772D59B649}" type="datetimeFigureOut">
               <a:rPr lang="pt-BR" smtClean="0"/>
-              <a:t>01/04/2017</a:t>
+              <a:t>04/04/2017</a:t>
             </a:fld>
             <a:endParaRPr lang="pt-BR"/>
           </a:p>
@@ -2077,7 +2084,7 @@
           <a:p>
             <a:fld id="{BBB81D1D-6B13-495D-83C2-9E772D59B649}" type="datetimeFigureOut">
               <a:rPr lang="pt-BR" smtClean="0"/>
-              <a:t>01/04/2017</a:t>
+              <a:t>04/04/2017</a:t>
             </a:fld>
             <a:endParaRPr lang="pt-BR"/>
           </a:p>
@@ -2470,7 +2477,7 @@
           <a:p>
             <a:fld id="{BBB81D1D-6B13-495D-83C2-9E772D59B649}" type="datetimeFigureOut">
               <a:rPr lang="pt-BR" smtClean="0"/>
-              <a:t>01/04/2017</a:t>
+              <a:t>04/04/2017</a:t>
             </a:fld>
             <a:endParaRPr lang="pt-BR"/>
           </a:p>
@@ -2640,7 +2647,7 @@
           <a:p>
             <a:fld id="{BBB81D1D-6B13-495D-83C2-9E772D59B649}" type="datetimeFigureOut">
               <a:rPr lang="pt-BR" smtClean="0"/>
-              <a:t>01/04/2017</a:t>
+              <a:t>04/04/2017</a:t>
             </a:fld>
             <a:endParaRPr lang="pt-BR"/>
           </a:p>
@@ -2820,7 +2827,7 @@
           <a:p>
             <a:fld id="{BBB81D1D-6B13-495D-83C2-9E772D59B649}" type="datetimeFigureOut">
               <a:rPr lang="pt-BR" smtClean="0"/>
-              <a:t>01/04/2017</a:t>
+              <a:t>04/04/2017</a:t>
             </a:fld>
             <a:endParaRPr lang="pt-BR"/>
           </a:p>
@@ -2990,7 +2997,7 @@
           <a:p>
             <a:fld id="{BBB81D1D-6B13-495D-83C2-9E772D59B649}" type="datetimeFigureOut">
               <a:rPr lang="pt-BR" smtClean="0"/>
-              <a:t>01/04/2017</a:t>
+              <a:t>04/04/2017</a:t>
             </a:fld>
             <a:endParaRPr lang="pt-BR"/>
           </a:p>
@@ -3237,7 +3244,7 @@
           <a:p>
             <a:fld id="{BBB81D1D-6B13-495D-83C2-9E772D59B649}" type="datetimeFigureOut">
               <a:rPr lang="pt-BR" smtClean="0"/>
-              <a:t>01/04/2017</a:t>
+              <a:t>04/04/2017</a:t>
             </a:fld>
             <a:endParaRPr lang="pt-BR"/>
           </a:p>
@@ -3469,7 +3476,7 @@
           <a:p>
             <a:fld id="{BBB81D1D-6B13-495D-83C2-9E772D59B649}" type="datetimeFigureOut">
               <a:rPr lang="pt-BR" smtClean="0"/>
-              <a:t>01/04/2017</a:t>
+              <a:t>04/04/2017</a:t>
             </a:fld>
             <a:endParaRPr lang="pt-BR"/>
           </a:p>
@@ -3843,7 +3850,7 @@
           <a:p>
             <a:fld id="{BBB81D1D-6B13-495D-83C2-9E772D59B649}" type="datetimeFigureOut">
               <a:rPr lang="pt-BR" smtClean="0"/>
-              <a:t>01/04/2017</a:t>
+              <a:t>04/04/2017</a:t>
             </a:fld>
             <a:endParaRPr lang="pt-BR"/>
           </a:p>
@@ -3966,7 +3973,7 @@
           <a:p>
             <a:fld id="{BBB81D1D-6B13-495D-83C2-9E772D59B649}" type="datetimeFigureOut">
               <a:rPr lang="pt-BR" smtClean="0"/>
-              <a:t>01/04/2017</a:t>
+              <a:t>04/04/2017</a:t>
             </a:fld>
             <a:endParaRPr lang="pt-BR"/>
           </a:p>
@@ -4061,7 +4068,7 @@
           <a:p>
             <a:fld id="{BBB81D1D-6B13-495D-83C2-9E772D59B649}" type="datetimeFigureOut">
               <a:rPr lang="pt-BR" smtClean="0"/>
-              <a:t>01/04/2017</a:t>
+              <a:t>04/04/2017</a:t>
             </a:fld>
             <a:endParaRPr lang="pt-BR"/>
           </a:p>
@@ -4316,7 +4323,7 @@
           <a:p>
             <a:fld id="{BBB81D1D-6B13-495D-83C2-9E772D59B649}" type="datetimeFigureOut">
               <a:rPr lang="pt-BR" smtClean="0"/>
-              <a:t>01/04/2017</a:t>
+              <a:t>04/04/2017</a:t>
             </a:fld>
             <a:endParaRPr lang="pt-BR"/>
           </a:p>
@@ -4621,7 +4628,7 @@
           <a:p>
             <a:fld id="{BBB81D1D-6B13-495D-83C2-9E772D59B649}" type="datetimeFigureOut">
               <a:rPr lang="pt-BR" smtClean="0"/>
-              <a:t>01/04/2017</a:t>
+              <a:t>04/04/2017</a:t>
             </a:fld>
             <a:endParaRPr lang="pt-BR"/>
           </a:p>
@@ -5323,7 +5330,7 @@
           <a:p>
             <a:fld id="{BBB81D1D-6B13-495D-83C2-9E772D59B649}" type="datetimeFigureOut">
               <a:rPr lang="pt-BR" smtClean="0"/>
-              <a:t>01/04/2017</a:t>
+              <a:t>04/04/2017</a:t>
             </a:fld>
             <a:endParaRPr lang="pt-BR"/>
           </a:p>
@@ -6116,7 +6123,7 @@
         <p:spPr/>
         <p:txBody>
           <a:bodyPr>
-            <a:normAutofit fontScale="92500" lnSpcReduction="20000"/>
+            <a:normAutofit fontScale="92500" lnSpcReduction="10000"/>
           </a:bodyPr>
           <a:lstStyle/>
           <a:p>
@@ -6130,15 +6137,7 @@
             </a:r>
             <a:r>
               <a:rPr lang="pt-BR" dirty="0"/>
-              <a:t> oferece o escalonador padrão POSIX, e também um proprietário chamado “</a:t>
-            </a:r>
-            <a:r>
-              <a:rPr lang="pt-BR" dirty="0" err="1"/>
-              <a:t>wind</a:t>
-            </a:r>
-            <a:r>
-              <a:rPr lang="pt-BR" dirty="0"/>
-              <a:t> </a:t>
+              <a:t> oferece o escalonador padrão POSIX, e também um proprietário chamado Wind </a:t>
             </a:r>
             <a:r>
               <a:rPr lang="pt-BR" dirty="0" err="1"/>
@@ -6146,27 +6145,67 @@
             </a:r>
             <a:r>
               <a:rPr lang="pt-BR" dirty="0"/>
-              <a:t>”.</a:t>
-            </a:r>
-          </a:p>
-          <a:p>
-            <a:r>
-              <a:rPr lang="pt-BR" dirty="0"/>
-              <a:t>Os escalonadores poder ser </a:t>
+              <a:t>.</a:t>
+            </a:r>
+          </a:p>
+          <a:p>
+            <a:pPr lvl="1"/>
+            <a:r>
+              <a:rPr lang="pt-BR" dirty="0"/>
+              <a:t>POSIX é </a:t>
             </a:r>
             <a:r>
               <a:rPr lang="pt-BR" dirty="0" err="1"/>
-              <a:t>preemptivos</a:t>
-            </a:r>
-            <a:r>
-              <a:rPr lang="pt-BR" dirty="0"/>
-              <a:t> ou round-Robin.</a:t>
-            </a:r>
-          </a:p>
-          <a:p>
-            <a:r>
-              <a:rPr lang="pt-BR" dirty="0"/>
-              <a:t>A diferença entre o escalonador POSIX e Wind é que o POSIX é baseado em processos, e o Wind é baseado em </a:t>
+              <a:t>Portable</a:t>
+            </a:r>
+            <a:r>
+              <a:rPr lang="pt-BR" dirty="0"/>
+              <a:t> </a:t>
+            </a:r>
+            <a:r>
+              <a:rPr lang="pt-BR" dirty="0" err="1"/>
+              <a:t>Operating</a:t>
+            </a:r>
+            <a:r>
+              <a:rPr lang="pt-BR" dirty="0"/>
+              <a:t> System Interface – normas de compatibilidade entre sistemas operacionais.</a:t>
+            </a:r>
+          </a:p>
+          <a:p>
+            <a:r>
+              <a:rPr lang="pt-BR" dirty="0"/>
+              <a:t>O escalonador pode ser </a:t>
+            </a:r>
+            <a:r>
+              <a:rPr lang="pt-BR" dirty="0" err="1"/>
+              <a:t>preemptivo</a:t>
+            </a:r>
+            <a:r>
+              <a:rPr lang="pt-BR" dirty="0"/>
+              <a:t> Round-Robin ou </a:t>
+            </a:r>
+            <a:r>
+              <a:rPr lang="pt-BR" dirty="0" err="1"/>
+              <a:t>Priority-based</a:t>
+            </a:r>
+            <a:r>
+              <a:rPr lang="pt-BR" dirty="0"/>
+              <a:t>.</a:t>
+            </a:r>
+          </a:p>
+          <a:p>
+            <a:pPr lvl="1"/>
+            <a:r>
+              <a:rPr lang="pt-BR" dirty="0"/>
+              <a:t>No </a:t>
+            </a:r>
+            <a:r>
+              <a:rPr lang="pt-BR" dirty="0" err="1"/>
+              <a:t>Rounr</a:t>
+            </a:r>
+            <a:r>
+              <a:rPr lang="pt-BR" dirty="0"/>
+              <a:t>-Robin, todas as </a:t>
             </a:r>
             <a:r>
               <a:rPr lang="pt-BR" dirty="0" err="1"/>
@@ -6174,14 +6213,15 @@
             </a:r>
             <a:r>
               <a:rPr lang="pt-BR" dirty="0"/>
-              <a:t>.</a:t>
-            </a:r>
-          </a:p>
-          <a:p>
-            <a:pPr lvl="1"/>
-            <a:r>
-              <a:rPr lang="pt-BR" dirty="0"/>
-              <a:t>Uma </a:t>
+              <a:t> tem a mesma prioridade, e o escalonador da um time-</a:t>
+            </a:r>
+            <a:r>
+              <a:rPr lang="pt-BR" dirty="0" err="1"/>
+              <a:t>slice</a:t>
+            </a:r>
+            <a:r>
+              <a:rPr lang="pt-BR" dirty="0"/>
+              <a:t> igual para todas as </a:t>
             </a:r>
             <a:r>
               <a:rPr lang="pt-BR" dirty="0" err="1"/>
@@ -6189,22 +6229,42 @@
             </a:r>
             <a:r>
               <a:rPr lang="pt-BR" dirty="0"/>
-              <a:t> pode acessar a memória diretamente, enquanto um processo só pode acessa um endereço de memoria no seu próprio “contexto” e de atributos herdados.</a:t>
+              <a:t>.</a:t>
             </a:r>
           </a:p>
           <a:p>
             <a:pPr lvl="1"/>
             <a:r>
               <a:rPr lang="pt-BR" dirty="0"/>
-              <a:t>No </a:t>
+              <a:t>O </a:t>
             </a:r>
             <a:r>
               <a:rPr lang="pt-BR" dirty="0" err="1"/>
-              <a:t>VxWorks</a:t>
-            </a:r>
-            <a:r>
-              <a:rPr lang="pt-BR" dirty="0"/>
-              <a:t>, todas as </a:t>
+              <a:t>Priority-Based</a:t>
+            </a:r>
+            <a:r>
+              <a:rPr lang="pt-BR" dirty="0"/>
+              <a:t> é o que usamos no </a:t>
+            </a:r>
+            <a:r>
+              <a:rPr lang="pt-BR" dirty="0" err="1"/>
+              <a:t>FreeRTOS</a:t>
+            </a:r>
+            <a:r>
+              <a:rPr lang="pt-BR" dirty="0"/>
+              <a:t>.</a:t>
+            </a:r>
+          </a:p>
+          <a:p>
+            <a:r>
+              <a:rPr lang="pt-BR" dirty="0"/>
+              <a:t>A numeração de prioridade é invertida (no Wind, quanto menor, maior a prioridade).</a:t>
+            </a:r>
+          </a:p>
+          <a:p>
+            <a:r>
+              <a:rPr lang="pt-BR" dirty="0"/>
+              <a:t>As </a:t>
             </a:r>
             <a:r>
               <a:rPr lang="pt-BR" dirty="0" err="1"/>
@@ -6212,7 +6272,7 @@
             </a:r>
             <a:r>
               <a:rPr lang="pt-BR" dirty="0"/>
-              <a:t> podem usar o mesmo espaço de memória, para fazer com que cada </a:t>
+              <a:t> de usuário tem prioridade de 100 até 255, sendo 255 a </a:t>
             </a:r>
             <a:r>
               <a:rPr lang="pt-BR" dirty="0" err="1"/>
@@ -6220,29 +6280,15 @@
             </a:r>
             <a:r>
               <a:rPr lang="pt-BR" dirty="0"/>
-              <a:t> tenha seu próprio espaço, é necessário fazer um mapeamento da memória com o add-on </a:t>
-            </a:r>
-            <a:r>
-              <a:rPr lang="pt-BR" dirty="0" err="1"/>
-              <a:t>VxVMI</a:t>
-            </a:r>
-            <a:r>
-              <a:rPr lang="pt-BR" dirty="0"/>
-              <a:t> (Virtual </a:t>
-            </a:r>
-            <a:r>
-              <a:rPr lang="pt-BR" dirty="0" err="1"/>
-              <a:t>Memory</a:t>
-            </a:r>
-            <a:r>
-              <a:rPr lang="pt-BR" dirty="0"/>
-              <a:t> Interface).</a:t>
-            </a:r>
-          </a:p>
-          <a:p>
-            <a:r>
-              <a:rPr lang="pt-BR" dirty="0"/>
-              <a:t>Outra diferença é que o algoritmo de escalonamento no POSIX é aplicado a cada processo, enquanto no Wind é aplicado ao sistema como um todo (ou todas as </a:t>
+              <a:t> de </a:t>
+            </a:r>
+            <a:r>
+              <a:rPr lang="pt-BR" i="1" dirty="0"/>
+              <a:t>menor</a:t>
+            </a:r>
+            <a:r>
+              <a:rPr lang="pt-BR" dirty="0"/>
+              <a:t> prioridade. As </a:t>
             </a:r>
             <a:r>
               <a:rPr lang="pt-BR" dirty="0" err="1"/>
@@ -6250,22 +6296,11 @@
             </a:r>
             <a:r>
               <a:rPr lang="pt-BR" dirty="0"/>
-              <a:t> do sistema são Round-Robin, ou todas são </a:t>
-            </a:r>
-            <a:r>
-              <a:rPr lang="pt-BR" dirty="0" err="1"/>
-              <a:t>preemptivas</a:t>
-            </a:r>
-            <a:r>
-              <a:rPr lang="pt-BR" dirty="0"/>
-              <a:t>).</a:t>
-            </a:r>
-          </a:p>
-          <a:p>
-            <a:r>
-              <a:rPr lang="pt-BR" dirty="0"/>
-              <a:t>A numeração de prioridade é invertida (no Wind, quanto menor, maior a prioridade).</a:t>
-            </a:r>
+              <a:t> do sistema vão de 0 até 99. A prioridade numero 100 é o default.</a:t>
+            </a:r>
+          </a:p>
+          <a:p>
+            <a:endParaRPr lang="pt-BR" dirty="0"/>
           </a:p>
           <a:p>
             <a:pPr marL="914400" lvl="2" indent="0">
@@ -6389,10 +6424,15 @@
             <p:ph idx="1"/>
           </p:nvPr>
         </p:nvSpPr>
-        <p:spPr/>
+        <p:spPr>
+          <a:xfrm>
+            <a:off x="677334" y="2016897"/>
+            <a:ext cx="8596668" cy="3880773"/>
+          </a:xfrm>
+        </p:spPr>
         <p:txBody>
           <a:bodyPr>
-            <a:normAutofit fontScale="92500" lnSpcReduction="10000"/>
+            <a:normAutofit fontScale="92500" lnSpcReduction="20000"/>
           </a:bodyPr>
           <a:lstStyle/>
           <a:p>
@@ -6418,14 +6458,21 @@
             </a:r>
           </a:p>
           <a:p>
+            <a:endParaRPr lang="pt-BR" dirty="0"/>
+          </a:p>
+          <a:p>
             <a:pPr lvl="1"/>
             <a:r>
-              <a:rPr lang="pt-BR" dirty="0" err="1"/>
+              <a:rPr lang="pt-BR" b="1" dirty="0" err="1"/>
               <a:t>Suspended</a:t>
             </a:r>
             <a:r>
-              <a:rPr lang="pt-BR" dirty="0"/>
-              <a:t>: Ociosa após sua criação, ou com sua execução inibida (mais usada para </a:t>
+              <a:rPr lang="pt-BR" b="1" dirty="0"/>
+              <a:t>: </a:t>
+            </a:r>
+            <a:r>
+              <a:rPr lang="pt-BR" dirty="0"/>
+              <a:t>Ociosa após sua criação, ou com sua execução inibida (mais usada para </a:t>
             </a:r>
             <a:r>
               <a:rPr lang="pt-BR" dirty="0" err="1"/>
@@ -6439,77 +6486,171 @@
           <a:p>
             <a:pPr lvl="1"/>
             <a:r>
+              <a:rPr lang="pt-BR" b="1" dirty="0" err="1"/>
+              <a:t>Ready</a:t>
+            </a:r>
+            <a:r>
+              <a:rPr lang="pt-BR" b="1" dirty="0"/>
+              <a:t>: </a:t>
+            </a:r>
+            <a:r>
+              <a:rPr lang="pt-BR" dirty="0"/>
+              <a:t>Esperando para “pegar” o processamento.</a:t>
+            </a:r>
+          </a:p>
+          <a:p>
+            <a:pPr lvl="1"/>
+            <a:r>
+              <a:rPr lang="pt-BR" b="1" dirty="0" err="1"/>
+              <a:t>Pending</a:t>
+            </a:r>
+            <a:r>
+              <a:rPr lang="pt-BR" dirty="0"/>
+              <a:t>: A </a:t>
+            </a:r>
+            <a:r>
               <a:rPr lang="pt-BR" dirty="0" err="1"/>
-              <a:t>Ready</a:t>
-            </a:r>
-            <a:r>
-              <a:rPr lang="pt-BR" dirty="0"/>
-              <a:t>: Esperando para “pegar” o processamento.</a:t>
+              <a:t>task</a:t>
+            </a:r>
+            <a:r>
+              <a:rPr lang="pt-BR" dirty="0"/>
+              <a:t> está bloqueada esperando uma mensagem de uma IPC (</a:t>
+            </a:r>
+            <a:r>
+              <a:rPr lang="pt-BR" dirty="0" err="1"/>
+              <a:t>inter</a:t>
+            </a:r>
+            <a:r>
+              <a:rPr lang="pt-BR" dirty="0"/>
+              <a:t> </a:t>
+            </a:r>
+            <a:r>
+              <a:rPr lang="pt-BR" dirty="0" err="1"/>
+              <a:t>process</a:t>
+            </a:r>
+            <a:r>
+              <a:rPr lang="pt-BR" dirty="0"/>
+              <a:t> communication) ou um recurso.</a:t>
             </a:r>
           </a:p>
           <a:p>
             <a:pPr lvl="1"/>
+            <a:r>
+              <a:rPr lang="pt-BR" b="1" dirty="0" err="1"/>
+              <a:t>Delayed</a:t>
+            </a:r>
+            <a:r>
+              <a:rPr lang="pt-BR" b="1" dirty="0"/>
+              <a:t>: </a:t>
+            </a:r>
+            <a:r>
+              <a:rPr lang="pt-BR" dirty="0"/>
+              <a:t>Dormindo por um certo período de tempo.</a:t>
+            </a:r>
+          </a:p>
+          <a:p>
+            <a:pPr lvl="1"/>
+            <a:r>
+              <a:rPr lang="pt-BR" b="1" dirty="0" err="1"/>
+              <a:t>Delayed</a:t>
+            </a:r>
+            <a:r>
+              <a:rPr lang="pt-BR" b="1" dirty="0"/>
+              <a:t> + </a:t>
+            </a:r>
+            <a:r>
+              <a:rPr lang="pt-BR" b="1" dirty="0" err="1"/>
+              <a:t>Suspended</a:t>
+            </a:r>
+            <a:r>
+              <a:rPr lang="pt-BR" dirty="0"/>
+              <a:t>: Após o </a:t>
+            </a:r>
+            <a:r>
+              <a:rPr lang="pt-BR" dirty="0" err="1"/>
+              <a:t>delay</a:t>
+            </a:r>
+            <a:r>
+              <a:rPr lang="pt-BR" dirty="0"/>
+              <a:t> e ainda não ocorreu uma preempção.</a:t>
+            </a:r>
+          </a:p>
+          <a:p>
+            <a:pPr lvl="1"/>
+            <a:r>
+              <a:rPr lang="pt-BR" b="1" dirty="0" err="1"/>
+              <a:t>Pended</a:t>
+            </a:r>
+            <a:r>
+              <a:rPr lang="pt-BR" b="1" dirty="0"/>
+              <a:t> for </a:t>
+            </a:r>
+            <a:r>
+              <a:rPr lang="pt-BR" b="1" dirty="0" err="1"/>
+              <a:t>an</a:t>
+            </a:r>
+            <a:r>
+              <a:rPr lang="pt-BR" b="1" dirty="0"/>
+              <a:t> IPC + </a:t>
+            </a:r>
+            <a:r>
+              <a:rPr lang="pt-BR" b="1" dirty="0" err="1"/>
+              <a:t>suspended</a:t>
+            </a:r>
+            <a:r>
+              <a:rPr lang="pt-BR" b="1" dirty="0"/>
+              <a:t>: </a:t>
+            </a:r>
+            <a:r>
+              <a:rPr lang="pt-BR" dirty="0"/>
+              <a:t>Estava </a:t>
+            </a:r>
             <a:r>
               <a:rPr lang="pt-BR" dirty="0" err="1"/>
               <a:t>Pending</a:t>
             </a:r>
             <a:r>
               <a:rPr lang="pt-BR" dirty="0"/>
-              <a:t>: A </a:t>
+              <a:t> e após receber a mensagem IPC por algum motivo não ocorreu preempção.</a:t>
+            </a:r>
+          </a:p>
+          <a:p>
+            <a:pPr lvl="1"/>
+            <a:r>
+              <a:rPr lang="pt-BR" b="1" dirty="0" err="1"/>
+              <a:t>Pended</a:t>
+            </a:r>
+            <a:r>
+              <a:rPr lang="pt-BR" b="1" dirty="0"/>
+              <a:t> for </a:t>
+            </a:r>
+            <a:r>
+              <a:rPr lang="pt-BR" b="1" dirty="0" err="1"/>
+              <a:t>an</a:t>
+            </a:r>
+            <a:r>
+              <a:rPr lang="pt-BR" b="1" dirty="0"/>
+              <a:t> IPC + </a:t>
+            </a:r>
+            <a:r>
+              <a:rPr lang="pt-BR" b="1" dirty="0" err="1"/>
+              <a:t>delayed</a:t>
+            </a:r>
+            <a:r>
+              <a:rPr lang="pt-BR" b="1" dirty="0"/>
+              <a:t>:</a:t>
+            </a:r>
+            <a:r>
+              <a:rPr lang="pt-BR" dirty="0"/>
+              <a:t> Estava </a:t>
             </a:r>
             <a:r>
               <a:rPr lang="pt-BR" dirty="0" err="1"/>
-              <a:t>task</a:t>
-            </a:r>
-            <a:r>
-              <a:rPr lang="pt-BR" dirty="0"/>
-              <a:t> está bloqueada esperando uma mensagem de uma IPC (</a:t>
-            </a:r>
-            <a:r>
-              <a:rPr lang="pt-BR" dirty="0" err="1"/>
-              <a:t>inter</a:t>
-            </a:r>
-            <a:r>
-              <a:rPr lang="pt-BR" dirty="0"/>
-              <a:t> </a:t>
-            </a:r>
-            <a:r>
-              <a:rPr lang="pt-BR" dirty="0" err="1"/>
-              <a:t>process</a:t>
-            </a:r>
-            <a:r>
-              <a:rPr lang="pt-BR" dirty="0"/>
-              <a:t> communication) ou um recurso.</a:t>
-            </a:r>
-          </a:p>
-          <a:p>
-            <a:pPr lvl="1"/>
-            <a:r>
-              <a:rPr lang="pt-BR" dirty="0" err="1"/>
-              <a:t>Delayed</a:t>
-            </a:r>
-            <a:r>
-              <a:rPr lang="pt-BR" dirty="0"/>
-              <a:t>: Dormindo por um certo período de tempo.</a:t>
-            </a:r>
-          </a:p>
-          <a:p>
-            <a:pPr lvl="1"/>
-            <a:r>
-              <a:rPr lang="pt-BR" dirty="0" err="1"/>
-              <a:t>Delayed</a:t>
-            </a:r>
-            <a:r>
-              <a:rPr lang="pt-BR" dirty="0"/>
-              <a:t> + </a:t>
-            </a:r>
-            <a:r>
-              <a:rPr lang="pt-BR" dirty="0" err="1"/>
-              <a:t>Suspended</a:t>
-            </a:r>
-            <a:r>
-              <a:rPr lang="pt-BR" dirty="0"/>
-              <a:t>: Após o </a:t>
+              <a:t>Pending</a:t>
+            </a:r>
+            <a:r>
+              <a:rPr lang="pt-BR" dirty="0"/>
+              <a:t> e então será executada após </a:t>
             </a:r>
             <a:r>
               <a:rPr lang="pt-BR" dirty="0" err="1"/>
@@ -6517,112 +6658,38 @@
             </a:r>
             <a:r>
               <a:rPr lang="pt-BR" dirty="0"/>
-              <a:t> e ainda não ocorreu uma preempção.</a:t>
+              <a:t>.</a:t>
             </a:r>
           </a:p>
           <a:p>
             <a:pPr lvl="1"/>
             <a:r>
-              <a:rPr lang="pt-BR" dirty="0" err="1"/>
+              <a:rPr lang="pt-BR" b="1" dirty="0" err="1"/>
               <a:t>Pended</a:t>
             </a:r>
             <a:r>
-              <a:rPr lang="pt-BR" dirty="0"/>
-              <a:t> for </a:t>
-            </a:r>
-            <a:r>
-              <a:rPr lang="pt-BR" dirty="0" err="1"/>
-              <a:t>an</a:t>
-            </a:r>
-            <a:r>
-              <a:rPr lang="pt-BR" dirty="0"/>
-              <a:t> IPC + </a:t>
-            </a:r>
-            <a:r>
-              <a:rPr lang="pt-BR" dirty="0" err="1"/>
+              <a:rPr lang="pt-BR" b="1" dirty="0"/>
+              <a:t> for na IPC + </a:t>
+            </a:r>
+            <a:r>
+              <a:rPr lang="pt-BR" b="1" dirty="0" err="1"/>
               <a:t>suspended</a:t>
             </a:r>
             <a:r>
-              <a:rPr lang="pt-BR" dirty="0"/>
-              <a:t>: Estava </a:t>
-            </a:r>
-            <a:r>
-              <a:rPr lang="pt-BR" dirty="0" err="1"/>
-              <a:t>Pending</a:t>
-            </a:r>
-            <a:r>
-              <a:rPr lang="pt-BR" dirty="0"/>
-              <a:t> e após receber a mensagem IPC por algum motivo não ocorreu preempção.</a:t>
-            </a:r>
-          </a:p>
-          <a:p>
-            <a:pPr lvl="1"/>
-            <a:r>
-              <a:rPr lang="pt-BR" dirty="0" err="1"/>
-              <a:t>Pended</a:t>
-            </a:r>
-            <a:r>
-              <a:rPr lang="pt-BR" dirty="0"/>
-              <a:t> for </a:t>
-            </a:r>
-            <a:r>
-              <a:rPr lang="pt-BR" dirty="0" err="1"/>
-              <a:t>an</a:t>
-            </a:r>
-            <a:r>
-              <a:rPr lang="pt-BR" dirty="0"/>
-              <a:t> IPC + </a:t>
-            </a:r>
-            <a:r>
-              <a:rPr lang="pt-BR" dirty="0" err="1"/>
-              <a:t>delayed</a:t>
-            </a:r>
-            <a:r>
-              <a:rPr lang="pt-BR" dirty="0"/>
-              <a:t>: Estava </a:t>
-            </a:r>
-            <a:r>
-              <a:rPr lang="pt-BR" dirty="0" err="1"/>
-              <a:t>Pending</a:t>
-            </a:r>
-            <a:r>
-              <a:rPr lang="pt-BR" dirty="0"/>
-              <a:t> e então será executada após </a:t>
-            </a:r>
-            <a:r>
-              <a:rPr lang="pt-BR" dirty="0" err="1"/>
+              <a:rPr lang="pt-BR" b="1" dirty="0"/>
+              <a:t> + </a:t>
+            </a:r>
+            <a:r>
+              <a:rPr lang="pt-BR" b="1" dirty="0" err="1"/>
               <a:t>delay</a:t>
             </a:r>
             <a:r>
-              <a:rPr lang="pt-BR" dirty="0"/>
-              <a:t>.</a:t>
-            </a:r>
-          </a:p>
-          <a:p>
-            <a:pPr lvl="1"/>
-            <a:r>
-              <a:rPr lang="pt-BR" dirty="0" err="1"/>
-              <a:t>Pended</a:t>
-            </a:r>
-            <a:r>
-              <a:rPr lang="pt-BR" dirty="0"/>
-              <a:t> for na IPC + </a:t>
-            </a:r>
-            <a:r>
-              <a:rPr lang="pt-BR" dirty="0" err="1"/>
-              <a:t>suspended</a:t>
-            </a:r>
-            <a:r>
-              <a:rPr lang="pt-BR" dirty="0"/>
-              <a:t> + </a:t>
-            </a:r>
-            <a:r>
-              <a:rPr lang="pt-BR" dirty="0" err="1"/>
-              <a:t>delay</a:t>
-            </a:r>
-            <a:r>
-              <a:rPr lang="pt-BR" dirty="0"/>
-              <a:t>: Está </a:t>
+              <a:rPr lang="pt-BR" b="1" dirty="0"/>
+              <a:t>: </a:t>
+            </a:r>
+            <a:r>
+              <a:rPr lang="pt-BR" dirty="0"/>
+              <a:t>Está </a:t>
             </a:r>
             <a:r>
               <a:rPr lang="pt-BR" dirty="0" err="1"/>
@@ -6747,106 +6814,1095 @@
           <a:chExt cx="0" cy="0"/>
         </a:xfrm>
       </p:grpSpPr>
-      <p:sp>
-        <p:nvSpPr>
-          <p:cNvPr id="3" name="Espaço Reservado para Conteúdo 2"/>
-          <p:cNvSpPr>
-            <a:spLocks noGrp="1"/>
-          </p:cNvSpPr>
-          <p:nvPr>
-            <p:ph idx="1"/>
-          </p:nvPr>
-        </p:nvSpPr>
-        <p:spPr/>
-        <p:txBody>
-          <a:bodyPr/>
+      <p:grpSp>
+        <p:nvGrpSpPr>
+          <p:cNvPr id="22" name="Agrupar 21"/>
+          <p:cNvGrpSpPr/>
+          <p:nvPr/>
+        </p:nvGrpSpPr>
+        <p:grpSpPr>
+          <a:xfrm>
+            <a:off x="875214" y="2481943"/>
+            <a:ext cx="8181702" cy="2194560"/>
+            <a:chOff x="2342605" y="2481943"/>
+            <a:chExt cx="6400800" cy="1600200"/>
+          </a:xfrm>
+        </p:grpSpPr>
+        <p:sp>
+          <p:nvSpPr>
+            <p:cNvPr id="4" name="Oval 4"/>
+            <p:cNvSpPr>
+              <a:spLocks noChangeArrowheads="1"/>
+            </p:cNvSpPr>
+            <p:nvPr/>
+          </p:nvSpPr>
+          <p:spPr bwMode="auto">
+            <a:xfrm>
+              <a:off x="2342605" y="2481943"/>
+              <a:ext cx="1752600" cy="609600"/>
+            </a:xfrm>
+            <a:prstGeom prst="ellipse">
+              <a:avLst/>
+            </a:prstGeom>
+            <a:solidFill>
+              <a:schemeClr val="accent1"/>
+            </a:solidFill>
+            <a:ln w="9525">
+              <a:solidFill>
+                <a:schemeClr val="tx1"/>
+              </a:solidFill>
+              <a:miter lim="800000"/>
+              <a:headEnd/>
+              <a:tailEnd/>
+            </a:ln>
+            <a:effectLst/>
+            <a:extLst>
+              <a:ext uri="{AF507438-7753-43E0-B8FC-AC1667EBCBE1}">
+                <a14:hiddenEffects xmlns:a14="http://schemas.microsoft.com/office/drawing/2010/main">
+                  <a:effectLst>
+                    <a:outerShdw dist="35921" dir="2700000" algn="ctr" rotWithShape="0">
+                      <a:schemeClr val="bg2"/>
+                    </a:outerShdw>
+                  </a:effectLst>
+                </a14:hiddenEffects>
+              </a:ext>
+            </a:extLst>
+          </p:spPr>
+          <p:txBody>
+            <a:bodyPr wrap="none" anchor="ctr"/>
+            <a:lstStyle/>
+            <a:p>
+              <a:endParaRPr lang="pt-BR"/>
+            </a:p>
+          </p:txBody>
+        </p:sp>
+        <p:sp>
+          <p:nvSpPr>
+            <p:cNvPr id="5" name="Oval 5"/>
+            <p:cNvSpPr>
+              <a:spLocks noChangeArrowheads="1"/>
+            </p:cNvSpPr>
+            <p:nvPr/>
+          </p:nvSpPr>
+          <p:spPr bwMode="auto">
+            <a:xfrm>
+              <a:off x="4704805" y="2481943"/>
+              <a:ext cx="1752600" cy="609600"/>
+            </a:xfrm>
+            <a:prstGeom prst="ellipse">
+              <a:avLst/>
+            </a:prstGeom>
+            <a:solidFill>
+              <a:schemeClr val="accent1"/>
+            </a:solidFill>
+            <a:ln w="9525">
+              <a:solidFill>
+                <a:schemeClr val="tx1"/>
+              </a:solidFill>
+              <a:miter lim="800000"/>
+              <a:headEnd/>
+              <a:tailEnd/>
+            </a:ln>
+            <a:effectLst/>
+            <a:extLst>
+              <a:ext uri="{AF507438-7753-43E0-B8FC-AC1667EBCBE1}">
+                <a14:hiddenEffects xmlns:a14="http://schemas.microsoft.com/office/drawing/2010/main">
+                  <a:effectLst>
+                    <a:outerShdw dist="35921" dir="2700000" algn="ctr" rotWithShape="0">
+                      <a:schemeClr val="bg2"/>
+                    </a:outerShdw>
+                  </a:effectLst>
+                </a14:hiddenEffects>
+              </a:ext>
+            </a:extLst>
+          </p:spPr>
+          <p:txBody>
+            <a:bodyPr wrap="none" anchor="ctr"/>
+            <a:lstStyle/>
+            <a:p>
+              <a:endParaRPr lang="pt-BR"/>
+            </a:p>
+          </p:txBody>
+        </p:sp>
+        <p:sp>
+          <p:nvSpPr>
+            <p:cNvPr id="6" name="Oval 6"/>
+            <p:cNvSpPr>
+              <a:spLocks noChangeArrowheads="1"/>
+            </p:cNvSpPr>
+            <p:nvPr/>
+          </p:nvSpPr>
+          <p:spPr bwMode="auto">
+            <a:xfrm>
+              <a:off x="6990805" y="2481943"/>
+              <a:ext cx="1752600" cy="609600"/>
+            </a:xfrm>
+            <a:prstGeom prst="ellipse">
+              <a:avLst/>
+            </a:prstGeom>
+            <a:solidFill>
+              <a:schemeClr val="accent1"/>
+            </a:solidFill>
+            <a:ln w="9525">
+              <a:solidFill>
+                <a:schemeClr val="tx1"/>
+              </a:solidFill>
+              <a:miter lim="800000"/>
+              <a:headEnd/>
+              <a:tailEnd/>
+            </a:ln>
+            <a:effectLst/>
+            <a:extLst>
+              <a:ext uri="{AF507438-7753-43E0-B8FC-AC1667EBCBE1}">
+                <a14:hiddenEffects xmlns:a14="http://schemas.microsoft.com/office/drawing/2010/main">
+                  <a:effectLst>
+                    <a:outerShdw dist="35921" dir="2700000" algn="ctr" rotWithShape="0">
+                      <a:schemeClr val="bg2"/>
+                    </a:outerShdw>
+                  </a:effectLst>
+                </a14:hiddenEffects>
+              </a:ext>
+            </a:extLst>
+          </p:spPr>
+          <p:txBody>
+            <a:bodyPr wrap="none" anchor="ctr"/>
+            <a:lstStyle/>
+            <a:p>
+              <a:endParaRPr lang="pt-BR"/>
+            </a:p>
+          </p:txBody>
+        </p:sp>
+        <p:sp>
+          <p:nvSpPr>
+            <p:cNvPr id="7" name="Oval 7"/>
+            <p:cNvSpPr>
+              <a:spLocks noChangeArrowheads="1"/>
+            </p:cNvSpPr>
+            <p:nvPr/>
+          </p:nvSpPr>
+          <p:spPr bwMode="auto">
+            <a:xfrm>
+              <a:off x="4704805" y="3472543"/>
+              <a:ext cx="1752600" cy="609600"/>
+            </a:xfrm>
+            <a:prstGeom prst="ellipse">
+              <a:avLst/>
+            </a:prstGeom>
+            <a:solidFill>
+              <a:schemeClr val="accent1"/>
+            </a:solidFill>
+            <a:ln w="9525">
+              <a:solidFill>
+                <a:schemeClr val="tx1"/>
+              </a:solidFill>
+              <a:miter lim="800000"/>
+              <a:headEnd/>
+              <a:tailEnd/>
+            </a:ln>
+            <a:effectLst/>
+            <a:extLst>
+              <a:ext uri="{AF507438-7753-43E0-B8FC-AC1667EBCBE1}">
+                <a14:hiddenEffects xmlns:a14="http://schemas.microsoft.com/office/drawing/2010/main">
+                  <a:effectLst>
+                    <a:outerShdw dist="35921" dir="2700000" algn="ctr" rotWithShape="0">
+                      <a:schemeClr val="bg2"/>
+                    </a:outerShdw>
+                  </a:effectLst>
+                </a14:hiddenEffects>
+              </a:ext>
+            </a:extLst>
+          </p:spPr>
+          <p:txBody>
+            <a:bodyPr wrap="none" anchor="ctr"/>
+            <a:lstStyle/>
+            <a:p>
+              <a:endParaRPr lang="pt-BR"/>
+            </a:p>
+          </p:txBody>
+        </p:sp>
+        <p:sp>
+          <p:nvSpPr>
+            <p:cNvPr id="8" name="Line 8"/>
+            <p:cNvSpPr>
+              <a:spLocks noChangeShapeType="1"/>
+            </p:cNvSpPr>
+            <p:nvPr/>
+          </p:nvSpPr>
+          <p:spPr bwMode="auto">
+            <a:xfrm>
+              <a:off x="3104605" y="3091543"/>
+              <a:ext cx="1676400" cy="838200"/>
+            </a:xfrm>
+            <a:prstGeom prst="line">
+              <a:avLst/>
+            </a:prstGeom>
+            <a:noFill/>
+            <a:ln w="9525">
+              <a:solidFill>
+                <a:schemeClr val="tx1"/>
+              </a:solidFill>
+              <a:miter lim="800000"/>
+              <a:headEnd/>
+              <a:tailEnd type="triangle" w="med" len="med"/>
+            </a:ln>
+            <a:effectLst/>
+            <a:extLst>
+              <a:ext uri="{909E8E84-426E-40DD-AFC4-6F175D3DCCD1}">
+                <a14:hiddenFill xmlns:a14="http://schemas.microsoft.com/office/drawing/2010/main">
+                  <a:noFill/>
+                </a14:hiddenFill>
+              </a:ext>
+              <a:ext uri="{AF507438-7753-43E0-B8FC-AC1667EBCBE1}">
+                <a14:hiddenEffects xmlns:a14="http://schemas.microsoft.com/office/drawing/2010/main">
+                  <a:effectLst>
+                    <a:outerShdw dist="35921" dir="2700000" algn="ctr" rotWithShape="0">
+                      <a:schemeClr val="bg2"/>
+                    </a:outerShdw>
+                  </a:effectLst>
+                </a14:hiddenEffects>
+              </a:ext>
+            </a:extLst>
+          </p:spPr>
+          <p:txBody>
+            <a:bodyPr wrap="none"/>
+            <a:lstStyle/>
+            <a:p>
+              <a:endParaRPr lang="pt-BR"/>
+            </a:p>
+          </p:txBody>
+        </p:sp>
+        <p:sp>
+          <p:nvSpPr>
+            <p:cNvPr id="9" name="Line 9"/>
+            <p:cNvSpPr>
+              <a:spLocks noChangeShapeType="1"/>
+            </p:cNvSpPr>
+            <p:nvPr/>
+          </p:nvSpPr>
+          <p:spPr bwMode="auto">
+            <a:xfrm>
+              <a:off x="5390605" y="3091543"/>
+              <a:ext cx="0" cy="381000"/>
+            </a:xfrm>
+            <a:prstGeom prst="line">
+              <a:avLst/>
+            </a:prstGeom>
+            <a:noFill/>
+            <a:ln w="9525">
+              <a:solidFill>
+                <a:schemeClr val="tx1"/>
+              </a:solidFill>
+              <a:miter lim="800000"/>
+              <a:headEnd/>
+              <a:tailEnd type="triangle" w="med" len="med"/>
+            </a:ln>
+            <a:effectLst/>
+            <a:extLst>
+              <a:ext uri="{909E8E84-426E-40DD-AFC4-6F175D3DCCD1}">
+                <a14:hiddenFill xmlns:a14="http://schemas.microsoft.com/office/drawing/2010/main">
+                  <a:noFill/>
+                </a14:hiddenFill>
+              </a:ext>
+              <a:ext uri="{AF507438-7753-43E0-B8FC-AC1667EBCBE1}">
+                <a14:hiddenEffects xmlns:a14="http://schemas.microsoft.com/office/drawing/2010/main">
+                  <a:effectLst>
+                    <a:outerShdw dist="35921" dir="2700000" algn="ctr" rotWithShape="0">
+                      <a:schemeClr val="bg2"/>
+                    </a:outerShdw>
+                  </a:effectLst>
+                </a14:hiddenEffects>
+              </a:ext>
+            </a:extLst>
+          </p:spPr>
+          <p:txBody>
+            <a:bodyPr wrap="none"/>
+            <a:lstStyle/>
+            <a:p>
+              <a:endParaRPr lang="pt-BR"/>
+            </a:p>
+          </p:txBody>
+        </p:sp>
+        <p:sp>
+          <p:nvSpPr>
+            <p:cNvPr id="10" name="Line 10"/>
+            <p:cNvSpPr>
+              <a:spLocks noChangeShapeType="1"/>
+            </p:cNvSpPr>
+            <p:nvPr/>
+          </p:nvSpPr>
+          <p:spPr bwMode="auto">
+            <a:xfrm flipH="1">
+              <a:off x="6381205" y="3039156"/>
+              <a:ext cx="1066800" cy="738187"/>
+            </a:xfrm>
+            <a:prstGeom prst="line">
+              <a:avLst/>
+            </a:prstGeom>
+            <a:noFill/>
+            <a:ln w="9525">
+              <a:solidFill>
+                <a:schemeClr val="tx1"/>
+              </a:solidFill>
+              <a:miter lim="800000"/>
+              <a:headEnd/>
+              <a:tailEnd type="triangle" w="med" len="med"/>
+            </a:ln>
+            <a:effectLst/>
+            <a:extLst>
+              <a:ext uri="{909E8E84-426E-40DD-AFC4-6F175D3DCCD1}">
+                <a14:hiddenFill xmlns:a14="http://schemas.microsoft.com/office/drawing/2010/main">
+                  <a:noFill/>
+                </a14:hiddenFill>
+              </a:ext>
+              <a:ext uri="{AF507438-7753-43E0-B8FC-AC1667EBCBE1}">
+                <a14:hiddenEffects xmlns:a14="http://schemas.microsoft.com/office/drawing/2010/main">
+                  <a:effectLst>
+                    <a:outerShdw dist="35921" dir="2700000" algn="ctr" rotWithShape="0">
+                      <a:schemeClr val="bg2"/>
+                    </a:outerShdw>
+                  </a:effectLst>
+                </a14:hiddenEffects>
+              </a:ext>
+            </a:extLst>
+          </p:spPr>
+          <p:txBody>
+            <a:bodyPr wrap="none"/>
+            <a:lstStyle/>
+            <a:p>
+              <a:endParaRPr lang="pt-BR"/>
+            </a:p>
+          </p:txBody>
+        </p:sp>
+        <p:sp>
+          <p:nvSpPr>
+            <p:cNvPr id="11" name="Line 11"/>
+            <p:cNvSpPr>
+              <a:spLocks noChangeShapeType="1"/>
+            </p:cNvSpPr>
+            <p:nvPr/>
+          </p:nvSpPr>
+          <p:spPr bwMode="auto">
+            <a:xfrm flipH="1" flipV="1">
+              <a:off x="3409405" y="3091543"/>
+              <a:ext cx="1295400" cy="609600"/>
+            </a:xfrm>
+            <a:prstGeom prst="line">
+              <a:avLst/>
+            </a:prstGeom>
+            <a:noFill/>
+            <a:ln w="9525">
+              <a:solidFill>
+                <a:schemeClr val="tx1"/>
+              </a:solidFill>
+              <a:miter lim="800000"/>
+              <a:headEnd/>
+              <a:tailEnd type="triangle" w="med" len="med"/>
+            </a:ln>
+            <a:effectLst/>
+            <a:extLst>
+              <a:ext uri="{909E8E84-426E-40DD-AFC4-6F175D3DCCD1}">
+                <a14:hiddenFill xmlns:a14="http://schemas.microsoft.com/office/drawing/2010/main">
+                  <a:noFill/>
+                </a14:hiddenFill>
+              </a:ext>
+              <a:ext uri="{AF507438-7753-43E0-B8FC-AC1667EBCBE1}">
+                <a14:hiddenEffects xmlns:a14="http://schemas.microsoft.com/office/drawing/2010/main">
+                  <a:effectLst>
+                    <a:outerShdw dist="35921" dir="2700000" algn="ctr" rotWithShape="0">
+                      <a:schemeClr val="bg2"/>
+                    </a:outerShdw>
+                  </a:effectLst>
+                </a14:hiddenEffects>
+              </a:ext>
+            </a:extLst>
+          </p:spPr>
+          <p:txBody>
+            <a:bodyPr wrap="none"/>
+            <a:lstStyle/>
+            <a:p>
+              <a:endParaRPr lang="pt-BR"/>
+            </a:p>
+          </p:txBody>
+        </p:sp>
+        <p:sp>
+          <p:nvSpPr>
+            <p:cNvPr id="12" name="Line 12"/>
+            <p:cNvSpPr>
+              <a:spLocks noChangeShapeType="1"/>
+            </p:cNvSpPr>
+            <p:nvPr/>
+          </p:nvSpPr>
+          <p:spPr bwMode="auto">
+            <a:xfrm flipV="1">
+              <a:off x="5543005" y="3091543"/>
+              <a:ext cx="0" cy="381000"/>
+            </a:xfrm>
+            <a:prstGeom prst="line">
+              <a:avLst/>
+            </a:prstGeom>
+            <a:noFill/>
+            <a:ln w="9525">
+              <a:solidFill>
+                <a:schemeClr val="tx1"/>
+              </a:solidFill>
+              <a:miter lim="800000"/>
+              <a:headEnd/>
+              <a:tailEnd type="triangle" w="med" len="med"/>
+            </a:ln>
+            <a:effectLst/>
+            <a:extLst>
+              <a:ext uri="{909E8E84-426E-40DD-AFC4-6F175D3DCCD1}">
+                <a14:hiddenFill xmlns:a14="http://schemas.microsoft.com/office/drawing/2010/main">
+                  <a:noFill/>
+                </a14:hiddenFill>
+              </a:ext>
+              <a:ext uri="{AF507438-7753-43E0-B8FC-AC1667EBCBE1}">
+                <a14:hiddenEffects xmlns:a14="http://schemas.microsoft.com/office/drawing/2010/main">
+                  <a:effectLst>
+                    <a:outerShdw dist="35921" dir="2700000" algn="ctr" rotWithShape="0">
+                      <a:schemeClr val="bg2"/>
+                    </a:outerShdw>
+                  </a:effectLst>
+                </a14:hiddenEffects>
+              </a:ext>
+            </a:extLst>
+          </p:spPr>
+          <p:txBody>
+            <a:bodyPr wrap="none"/>
+            <a:lstStyle/>
+            <a:p>
+              <a:endParaRPr lang="pt-BR"/>
+            </a:p>
+          </p:txBody>
+        </p:sp>
+        <p:sp>
+          <p:nvSpPr>
+            <p:cNvPr id="13" name="Text Box 13"/>
+            <p:cNvSpPr txBox="1">
+              <a:spLocks noChangeArrowheads="1"/>
+            </p:cNvSpPr>
+            <p:nvPr/>
+          </p:nvSpPr>
+          <p:spPr bwMode="auto">
+            <a:xfrm>
+              <a:off x="2685505" y="2660312"/>
+              <a:ext cx="1219200" cy="269305"/>
+            </a:xfrm>
+            <a:prstGeom prst="rect">
+              <a:avLst/>
+            </a:prstGeom>
+            <a:noFill/>
+            <a:ln>
+              <a:noFill/>
+            </a:ln>
+            <a:effectLst/>
+            <a:extLst>
+              <a:ext uri="{909E8E84-426E-40DD-AFC4-6F175D3DCCD1}">
+                <a14:hiddenFill xmlns:a14="http://schemas.microsoft.com/office/drawing/2010/main">
+                  <a:solidFill>
+                    <a:schemeClr val="accent1"/>
+                  </a:solidFill>
+                </a14:hiddenFill>
+              </a:ext>
+              <a:ext uri="{91240B29-F687-4F45-9708-019B960494DF}">
+                <a14:hiddenLine xmlns:a14="http://schemas.microsoft.com/office/drawing/2010/main" w="9525">
+                  <a:solidFill>
+                    <a:schemeClr val="tx1"/>
+                  </a:solidFill>
+                  <a:miter lim="800000"/>
+                  <a:headEnd/>
+                  <a:tailEnd/>
+                </a14:hiddenLine>
+              </a:ext>
+              <a:ext uri="{AF507438-7753-43E0-B8FC-AC1667EBCBE1}">
+                <a14:hiddenEffects xmlns:a14="http://schemas.microsoft.com/office/drawing/2010/main">
+                  <a:effectLst>
+                    <a:outerShdw dist="35921" dir="2700000" algn="ctr" rotWithShape="0">
+                      <a:schemeClr val="bg2"/>
+                    </a:outerShdw>
+                  </a:effectLst>
+                </a14:hiddenEffects>
+              </a:ext>
+            </a:extLst>
+          </p:spPr>
+          <p:txBody>
+            <a:bodyPr wrap="square">
+              <a:spAutoFit/>
+            </a:bodyPr>
+            <a:lstStyle/>
+            <a:p>
+              <a:pPr algn="l">
+                <a:spcBef>
+                  <a:spcPct val="50000"/>
+                </a:spcBef>
+              </a:pPr>
+              <a:r>
+                <a:rPr lang="en-US" altLang="pt-BR" dirty="0"/>
+                <a:t>Pending</a:t>
+              </a:r>
+            </a:p>
+          </p:txBody>
+        </p:sp>
+        <p:sp>
+          <p:nvSpPr>
+            <p:cNvPr id="14" name="Text Box 14"/>
+            <p:cNvSpPr txBox="1">
+              <a:spLocks noChangeArrowheads="1"/>
+            </p:cNvSpPr>
+            <p:nvPr/>
+          </p:nvSpPr>
+          <p:spPr bwMode="auto">
+            <a:xfrm>
+              <a:off x="5314405" y="2558143"/>
+              <a:ext cx="768530" cy="269305"/>
+            </a:xfrm>
+            <a:prstGeom prst="rect">
+              <a:avLst/>
+            </a:prstGeom>
+            <a:noFill/>
+            <a:ln>
+              <a:noFill/>
+            </a:ln>
+            <a:effectLst/>
+            <a:extLst>
+              <a:ext uri="{909E8E84-426E-40DD-AFC4-6F175D3DCCD1}">
+                <a14:hiddenFill xmlns:a14="http://schemas.microsoft.com/office/drawing/2010/main">
+                  <a:solidFill>
+                    <a:schemeClr val="accent1"/>
+                  </a:solidFill>
+                </a14:hiddenFill>
+              </a:ext>
+              <a:ext uri="{91240B29-F687-4F45-9708-019B960494DF}">
+                <a14:hiddenLine xmlns:a14="http://schemas.microsoft.com/office/drawing/2010/main" w="9525">
+                  <a:solidFill>
+                    <a:schemeClr val="tx1"/>
+                  </a:solidFill>
+                  <a:miter lim="800000"/>
+                  <a:headEnd/>
+                  <a:tailEnd/>
+                </a14:hiddenLine>
+              </a:ext>
+              <a:ext uri="{AF507438-7753-43E0-B8FC-AC1667EBCBE1}">
+                <a14:hiddenEffects xmlns:a14="http://schemas.microsoft.com/office/drawing/2010/main">
+                  <a:effectLst>
+                    <a:outerShdw dist="35921" dir="2700000" algn="ctr" rotWithShape="0">
+                      <a:schemeClr val="bg2"/>
+                    </a:outerShdw>
+                  </a:effectLst>
+                </a14:hiddenEffects>
+              </a:ext>
+            </a:extLst>
+          </p:spPr>
+          <p:txBody>
+            <a:bodyPr wrap="square">
+              <a:spAutoFit/>
+            </a:bodyPr>
+            <a:lstStyle/>
+            <a:p>
+              <a:pPr algn="l">
+                <a:spcBef>
+                  <a:spcPct val="50000"/>
+                </a:spcBef>
+              </a:pPr>
+              <a:r>
+                <a:rPr lang="en-US" altLang="pt-BR" dirty="0"/>
+                <a:t>Ready</a:t>
+              </a:r>
+            </a:p>
+          </p:txBody>
+        </p:sp>
+        <p:sp>
+          <p:nvSpPr>
+            <p:cNvPr id="15" name="Text Box 15"/>
+            <p:cNvSpPr txBox="1">
+              <a:spLocks noChangeArrowheads="1"/>
+            </p:cNvSpPr>
+            <p:nvPr/>
+          </p:nvSpPr>
+          <p:spPr bwMode="auto">
+            <a:xfrm>
+              <a:off x="7524205" y="2593637"/>
+              <a:ext cx="848785" cy="269305"/>
+            </a:xfrm>
+            <a:prstGeom prst="rect">
+              <a:avLst/>
+            </a:prstGeom>
+            <a:noFill/>
+            <a:ln>
+              <a:noFill/>
+            </a:ln>
+            <a:effectLst/>
+            <a:extLst>
+              <a:ext uri="{909E8E84-426E-40DD-AFC4-6F175D3DCCD1}">
+                <a14:hiddenFill xmlns:a14="http://schemas.microsoft.com/office/drawing/2010/main">
+                  <a:solidFill>
+                    <a:schemeClr val="accent1"/>
+                  </a:solidFill>
+                </a14:hiddenFill>
+              </a:ext>
+              <a:ext uri="{91240B29-F687-4F45-9708-019B960494DF}">
+                <a14:hiddenLine xmlns:a14="http://schemas.microsoft.com/office/drawing/2010/main" w="9525">
+                  <a:solidFill>
+                    <a:schemeClr val="tx1"/>
+                  </a:solidFill>
+                  <a:miter lim="800000"/>
+                  <a:headEnd/>
+                  <a:tailEnd/>
+                </a14:hiddenLine>
+              </a:ext>
+              <a:ext uri="{AF507438-7753-43E0-B8FC-AC1667EBCBE1}">
+                <a14:hiddenEffects xmlns:a14="http://schemas.microsoft.com/office/drawing/2010/main">
+                  <a:effectLst>
+                    <a:outerShdw dist="35921" dir="2700000" algn="ctr" rotWithShape="0">
+                      <a:schemeClr val="bg2"/>
+                    </a:outerShdw>
+                  </a:effectLst>
+                </a14:hiddenEffects>
+              </a:ext>
+            </a:extLst>
+          </p:spPr>
+          <p:txBody>
+            <a:bodyPr wrap="square">
+              <a:spAutoFit/>
+            </a:bodyPr>
+            <a:lstStyle/>
+            <a:p>
+              <a:pPr algn="l">
+                <a:spcBef>
+                  <a:spcPct val="50000"/>
+                </a:spcBef>
+              </a:pPr>
+              <a:r>
+                <a:rPr lang="en-US" altLang="pt-BR" dirty="0"/>
+                <a:t>Delayed</a:t>
+              </a:r>
+            </a:p>
+          </p:txBody>
+        </p:sp>
+        <p:sp>
+          <p:nvSpPr>
+            <p:cNvPr id="16" name="Line 16"/>
+            <p:cNvSpPr>
+              <a:spLocks noChangeShapeType="1"/>
+            </p:cNvSpPr>
+            <p:nvPr/>
+          </p:nvSpPr>
+          <p:spPr bwMode="auto">
+            <a:xfrm flipV="1">
+              <a:off x="6381205" y="3015343"/>
+              <a:ext cx="914400" cy="609600"/>
+            </a:xfrm>
+            <a:prstGeom prst="line">
+              <a:avLst/>
+            </a:prstGeom>
+            <a:noFill/>
+            <a:ln w="9525">
+              <a:solidFill>
+                <a:schemeClr val="tx1"/>
+              </a:solidFill>
+              <a:miter lim="800000"/>
+              <a:headEnd/>
+              <a:tailEnd type="triangle" w="med" len="med"/>
+            </a:ln>
+            <a:effectLst/>
+            <a:extLst>
+              <a:ext uri="{909E8E84-426E-40DD-AFC4-6F175D3DCCD1}">
+                <a14:hiddenFill xmlns:a14="http://schemas.microsoft.com/office/drawing/2010/main">
+                  <a:noFill/>
+                </a14:hiddenFill>
+              </a:ext>
+              <a:ext uri="{AF507438-7753-43E0-B8FC-AC1667EBCBE1}">
+                <a14:hiddenEffects xmlns:a14="http://schemas.microsoft.com/office/drawing/2010/main">
+                  <a:effectLst>
+                    <a:outerShdw dist="35921" dir="2700000" algn="ctr" rotWithShape="0">
+                      <a:schemeClr val="bg2"/>
+                    </a:outerShdw>
+                  </a:effectLst>
+                </a14:hiddenEffects>
+              </a:ext>
+            </a:extLst>
+          </p:spPr>
+          <p:txBody>
+            <a:bodyPr wrap="none"/>
+            <a:lstStyle/>
+            <a:p>
+              <a:endParaRPr lang="pt-BR"/>
+            </a:p>
+          </p:txBody>
+        </p:sp>
+        <p:sp>
+          <p:nvSpPr>
+            <p:cNvPr id="17" name="Text Box 18"/>
+            <p:cNvSpPr txBox="1">
+              <a:spLocks noChangeArrowheads="1"/>
+            </p:cNvSpPr>
+            <p:nvPr/>
+          </p:nvSpPr>
+          <p:spPr bwMode="auto">
+            <a:xfrm>
+              <a:off x="5075605" y="3660437"/>
+              <a:ext cx="1143000" cy="269305"/>
+            </a:xfrm>
+            <a:prstGeom prst="rect">
+              <a:avLst/>
+            </a:prstGeom>
+            <a:noFill/>
+            <a:ln>
+              <a:noFill/>
+            </a:ln>
+            <a:effectLst/>
+            <a:extLst>
+              <a:ext uri="{909E8E84-426E-40DD-AFC4-6F175D3DCCD1}">
+                <a14:hiddenFill xmlns:a14="http://schemas.microsoft.com/office/drawing/2010/main">
+                  <a:solidFill>
+                    <a:schemeClr val="accent1"/>
+                  </a:solidFill>
+                </a14:hiddenFill>
+              </a:ext>
+              <a:ext uri="{91240B29-F687-4F45-9708-019B960494DF}">
+                <a14:hiddenLine xmlns:a14="http://schemas.microsoft.com/office/drawing/2010/main" w="9525">
+                  <a:solidFill>
+                    <a:schemeClr val="tx1"/>
+                  </a:solidFill>
+                  <a:miter lim="800000"/>
+                  <a:headEnd/>
+                  <a:tailEnd/>
+                </a14:hiddenLine>
+              </a:ext>
+              <a:ext uri="{AF507438-7753-43E0-B8FC-AC1667EBCBE1}">
+                <a14:hiddenEffects xmlns:a14="http://schemas.microsoft.com/office/drawing/2010/main">
+                  <a:effectLst>
+                    <a:outerShdw dist="35921" dir="2700000" algn="ctr" rotWithShape="0">
+                      <a:schemeClr val="bg2"/>
+                    </a:outerShdw>
+                  </a:effectLst>
+                </a14:hiddenEffects>
+              </a:ext>
+            </a:extLst>
+          </p:spPr>
+          <p:txBody>
+            <a:bodyPr wrap="square">
+              <a:spAutoFit/>
+            </a:bodyPr>
+            <a:lstStyle/>
+            <a:p>
+              <a:pPr algn="l">
+                <a:spcBef>
+                  <a:spcPct val="50000"/>
+                </a:spcBef>
+              </a:pPr>
+              <a:r>
+                <a:rPr lang="en-US" altLang="pt-BR" u="sng" dirty="0"/>
+                <a:t>Suspended</a:t>
+              </a:r>
+            </a:p>
+          </p:txBody>
+        </p:sp>
+        <p:sp>
+          <p:nvSpPr>
+            <p:cNvPr id="18" name="Line 20"/>
+            <p:cNvSpPr>
+              <a:spLocks noChangeShapeType="1"/>
+            </p:cNvSpPr>
+            <p:nvPr/>
+          </p:nvSpPr>
+          <p:spPr bwMode="auto">
+            <a:xfrm>
+              <a:off x="4095205" y="2710543"/>
+              <a:ext cx="609600" cy="0"/>
+            </a:xfrm>
+            <a:prstGeom prst="line">
+              <a:avLst/>
+            </a:prstGeom>
+            <a:noFill/>
+            <a:ln w="9525">
+              <a:solidFill>
+                <a:schemeClr val="tx1"/>
+              </a:solidFill>
+              <a:miter lim="800000"/>
+              <a:headEnd/>
+              <a:tailEnd type="triangle" w="med" len="med"/>
+            </a:ln>
+            <a:effectLst/>
+            <a:extLst>
+              <a:ext uri="{909E8E84-426E-40DD-AFC4-6F175D3DCCD1}">
+                <a14:hiddenFill xmlns:a14="http://schemas.microsoft.com/office/drawing/2010/main">
+                  <a:noFill/>
+                </a14:hiddenFill>
+              </a:ext>
+              <a:ext uri="{AF507438-7753-43E0-B8FC-AC1667EBCBE1}">
+                <a14:hiddenEffects xmlns:a14="http://schemas.microsoft.com/office/drawing/2010/main">
+                  <a:effectLst>
+                    <a:outerShdw dist="35921" dir="2700000" algn="ctr" rotWithShape="0">
+                      <a:schemeClr val="bg2"/>
+                    </a:outerShdw>
+                  </a:effectLst>
+                </a14:hiddenEffects>
+              </a:ext>
+            </a:extLst>
+          </p:spPr>
+          <p:txBody>
+            <a:bodyPr wrap="none"/>
+            <a:lstStyle/>
+            <a:p>
+              <a:endParaRPr lang="pt-BR"/>
+            </a:p>
+          </p:txBody>
+        </p:sp>
+        <p:sp>
+          <p:nvSpPr>
+            <p:cNvPr id="19" name="Line 21"/>
+            <p:cNvSpPr>
+              <a:spLocks noChangeShapeType="1"/>
+            </p:cNvSpPr>
+            <p:nvPr/>
+          </p:nvSpPr>
+          <p:spPr bwMode="auto">
+            <a:xfrm flipH="1">
+              <a:off x="4095205" y="2862943"/>
+              <a:ext cx="609600" cy="0"/>
+            </a:xfrm>
+            <a:prstGeom prst="line">
+              <a:avLst/>
+            </a:prstGeom>
+            <a:noFill/>
+            <a:ln w="9525">
+              <a:solidFill>
+                <a:schemeClr val="tx1"/>
+              </a:solidFill>
+              <a:miter lim="800000"/>
+              <a:headEnd/>
+              <a:tailEnd type="triangle" w="med" len="med"/>
+            </a:ln>
+            <a:effectLst/>
+            <a:extLst>
+              <a:ext uri="{909E8E84-426E-40DD-AFC4-6F175D3DCCD1}">
+                <a14:hiddenFill xmlns:a14="http://schemas.microsoft.com/office/drawing/2010/main">
+                  <a:noFill/>
+                </a14:hiddenFill>
+              </a:ext>
+              <a:ext uri="{AF507438-7753-43E0-B8FC-AC1667EBCBE1}">
+                <a14:hiddenEffects xmlns:a14="http://schemas.microsoft.com/office/drawing/2010/main">
+                  <a:effectLst>
+                    <a:outerShdw dist="35921" dir="2700000" algn="ctr" rotWithShape="0">
+                      <a:schemeClr val="bg2"/>
+                    </a:outerShdw>
+                  </a:effectLst>
+                </a14:hiddenEffects>
+              </a:ext>
+            </a:extLst>
+          </p:spPr>
+          <p:txBody>
+            <a:bodyPr wrap="none"/>
+            <a:lstStyle/>
+            <a:p>
+              <a:endParaRPr lang="pt-BR"/>
+            </a:p>
+          </p:txBody>
+        </p:sp>
+        <p:sp>
+          <p:nvSpPr>
+            <p:cNvPr id="20" name="Line 22"/>
+            <p:cNvSpPr>
+              <a:spLocks noChangeShapeType="1"/>
+            </p:cNvSpPr>
+            <p:nvPr/>
+          </p:nvSpPr>
+          <p:spPr bwMode="auto">
+            <a:xfrm>
+              <a:off x="6457405" y="2710543"/>
+              <a:ext cx="609600" cy="0"/>
+            </a:xfrm>
+            <a:prstGeom prst="line">
+              <a:avLst/>
+            </a:prstGeom>
+            <a:noFill/>
+            <a:ln w="9525">
+              <a:solidFill>
+                <a:schemeClr val="tx1"/>
+              </a:solidFill>
+              <a:miter lim="800000"/>
+              <a:headEnd/>
+              <a:tailEnd type="triangle" w="med" len="med"/>
+            </a:ln>
+            <a:effectLst/>
+            <a:extLst>
+              <a:ext uri="{909E8E84-426E-40DD-AFC4-6F175D3DCCD1}">
+                <a14:hiddenFill xmlns:a14="http://schemas.microsoft.com/office/drawing/2010/main">
+                  <a:noFill/>
+                </a14:hiddenFill>
+              </a:ext>
+              <a:ext uri="{AF507438-7753-43E0-B8FC-AC1667EBCBE1}">
+                <a14:hiddenEffects xmlns:a14="http://schemas.microsoft.com/office/drawing/2010/main">
+                  <a:effectLst>
+                    <a:outerShdw dist="35921" dir="2700000" algn="ctr" rotWithShape="0">
+                      <a:schemeClr val="bg2"/>
+                    </a:outerShdw>
+                  </a:effectLst>
+                </a14:hiddenEffects>
+              </a:ext>
+            </a:extLst>
+          </p:spPr>
+          <p:txBody>
+            <a:bodyPr wrap="none"/>
+            <a:lstStyle/>
+            <a:p>
+              <a:endParaRPr lang="pt-BR"/>
+            </a:p>
+          </p:txBody>
+        </p:sp>
+        <p:sp>
+          <p:nvSpPr>
+            <p:cNvPr id="21" name="Line 23"/>
+            <p:cNvSpPr>
+              <a:spLocks noChangeShapeType="1"/>
+            </p:cNvSpPr>
+            <p:nvPr/>
+          </p:nvSpPr>
+          <p:spPr bwMode="auto">
+            <a:xfrm flipH="1">
+              <a:off x="6381205" y="2862943"/>
+              <a:ext cx="609600" cy="0"/>
+            </a:xfrm>
+            <a:prstGeom prst="line">
+              <a:avLst/>
+            </a:prstGeom>
+            <a:noFill/>
+            <a:ln w="9525">
+              <a:solidFill>
+                <a:schemeClr val="tx1"/>
+              </a:solidFill>
+              <a:miter lim="800000"/>
+              <a:headEnd/>
+              <a:tailEnd type="triangle" w="med" len="med"/>
+            </a:ln>
+            <a:effectLst/>
+            <a:extLst>
+              <a:ext uri="{909E8E84-426E-40DD-AFC4-6F175D3DCCD1}">
+                <a14:hiddenFill xmlns:a14="http://schemas.microsoft.com/office/drawing/2010/main">
+                  <a:noFill/>
+                </a14:hiddenFill>
+              </a:ext>
+              <a:ext uri="{AF507438-7753-43E0-B8FC-AC1667EBCBE1}">
+                <a14:hiddenEffects xmlns:a14="http://schemas.microsoft.com/office/drawing/2010/main">
+                  <a:effectLst>
+                    <a:outerShdw dist="35921" dir="2700000" algn="ctr" rotWithShape="0">
+                      <a:schemeClr val="bg2"/>
+                    </a:outerShdw>
+                  </a:effectLst>
+                </a14:hiddenEffects>
+              </a:ext>
+            </a:extLst>
+          </p:spPr>
+          <p:txBody>
+            <a:bodyPr wrap="none"/>
+            <a:lstStyle/>
+            <a:p>
+              <a:endParaRPr lang="pt-BR"/>
+            </a:p>
+          </p:txBody>
+        </p:sp>
+      </p:grpSp>
+      <p:pic>
+        <p:nvPicPr>
+          <p:cNvPr id="23" name="Imagem 22"/>
+          <p:cNvPicPr>
+            <a:picLocks noChangeAspect="1"/>
+          </p:cNvPicPr>
+          <p:nvPr/>
+        </p:nvPicPr>
+        <p:blipFill>
+          <a:blip r:embed="rId2">
+            <a:extLst>
+              <a:ext uri="{28A0092B-C50C-407E-A947-70E740481C1C}">
+                <a14:useLocalDpi xmlns:a14="http://schemas.microsoft.com/office/drawing/2010/main" val="0"/>
+              </a:ext>
+            </a:extLst>
+          </a:blip>
+          <a:stretch>
+            <a:fillRect/>
+          </a:stretch>
+        </p:blipFill>
+        <p:spPr>
+          <a:xfrm>
+            <a:off x="295422" y="276174"/>
+            <a:ext cx="2307101" cy="1075432"/>
+          </a:xfrm>
+          <a:prstGeom prst="rect">
+            <a:avLst/>
+          </a:prstGeom>
+        </p:spPr>
+      </p:pic>
+      <p:sp>
+        <p:nvSpPr>
+          <p:cNvPr id="24" name="Retângulo 23"/>
+          <p:cNvSpPr/>
+          <p:nvPr/>
+        </p:nvSpPr>
+        <p:spPr>
+          <a:xfrm>
+            <a:off x="5938665" y="982274"/>
+            <a:ext cx="3335337" cy="369332"/>
+          </a:xfrm>
+          <a:prstGeom prst="rect">
+            <a:avLst/>
+          </a:prstGeom>
+        </p:spPr>
+        <p:txBody>
+          <a:bodyPr vert="horz" lIns="91440" tIns="45720" rIns="91440" bIns="45720" rtlCol="0" anchor="t">
+            <a:normAutofit fontScale="55000" lnSpcReduction="20000"/>
+          </a:bodyPr>
           <a:lstStyle/>
           <a:p>
-            <a:r>
-              <a:rPr lang="pt-BR" dirty="0"/>
-              <a:t>As funções do Kernel se encontram nos arquivos “</a:t>
-            </a:r>
-            <a:r>
-              <a:rPr lang="pt-BR" dirty="0" err="1"/>
-              <a:t>vxWorks.h</a:t>
-            </a:r>
-            <a:r>
-              <a:rPr lang="pt-BR" dirty="0"/>
-              <a:t>” e “</a:t>
-            </a:r>
-            <a:r>
-              <a:rPr lang="pt-BR" dirty="0" err="1"/>
-              <a:t>kernelLib.h</a:t>
-            </a:r>
-            <a:r>
-              <a:rPr lang="pt-BR" dirty="0"/>
-              <a:t>”. Funções de </a:t>
-            </a:r>
-            <a:r>
-              <a:rPr lang="pt-BR" dirty="0" err="1"/>
-              <a:t>tasks</a:t>
-            </a:r>
-            <a:r>
-              <a:rPr lang="pt-BR" dirty="0"/>
-              <a:t> e do sistema estão nos arquivos “</a:t>
-            </a:r>
-            <a:r>
-              <a:rPr lang="pt-BR" dirty="0" err="1"/>
-              <a:t>taskLib.h</a:t>
-            </a:r>
-            <a:r>
-              <a:rPr lang="pt-BR" dirty="0"/>
-              <a:t>” e “</a:t>
-            </a:r>
-            <a:r>
-              <a:rPr lang="pt-BR" dirty="0" err="1"/>
-              <a:t>sysLib.h</a:t>
-            </a:r>
-            <a:r>
-              <a:rPr lang="pt-BR" dirty="0"/>
-              <a:t>”.</a:t>
-            </a:r>
-          </a:p>
-          <a:p>
-            <a:r>
-              <a:rPr lang="pt-BR" dirty="0"/>
-              <a:t>As </a:t>
-            </a:r>
-            <a:r>
-              <a:rPr lang="pt-BR" dirty="0" err="1"/>
-              <a:t>tasks</a:t>
-            </a:r>
-            <a:r>
-              <a:rPr lang="pt-BR" dirty="0"/>
-              <a:t> de usuário tem prioridade de 100 até 255, sendo 255 a </a:t>
-            </a:r>
-            <a:r>
-              <a:rPr lang="pt-BR" dirty="0" err="1"/>
-              <a:t>task</a:t>
-            </a:r>
-            <a:r>
-              <a:rPr lang="pt-BR" dirty="0"/>
-              <a:t> de </a:t>
-            </a:r>
-            <a:r>
-              <a:rPr lang="pt-BR" i="1" dirty="0"/>
-              <a:t>menor</a:t>
-            </a:r>
-            <a:r>
-              <a:rPr lang="pt-BR" dirty="0"/>
-              <a:t> prioridade. As </a:t>
-            </a:r>
-            <a:r>
-              <a:rPr lang="pt-BR" dirty="0" err="1"/>
-              <a:t>task</a:t>
-            </a:r>
-            <a:r>
-              <a:rPr lang="pt-BR" dirty="0"/>
-              <a:t> do sistema vão de 0 até 99. A prioridade numero 100 é o default.</a:t>
-            </a:r>
-          </a:p>
-        </p:txBody>
-      </p:sp>
+            <a:pPr>
+              <a:spcBef>
+                <a:spcPct val="0"/>
+              </a:spcBef>
+            </a:pPr>
+            <a:r>
+              <a:rPr lang="pt-BR" sz="3600" dirty="0">
+                <a:solidFill>
+                  <a:schemeClr val="accent1"/>
+                </a:solidFill>
+                <a:latin typeface="+mj-lt"/>
+                <a:ea typeface="+mj-ea"/>
+                <a:cs typeface="+mj-cs"/>
+              </a:rPr>
+              <a:t>Gerenciamento de Tarefas:</a:t>
+            </a:r>
+          </a:p>
+        </p:txBody>
+      </p:sp>
+    </p:spTree>
+    <p:extLst>
+      <p:ext uri="{BB962C8B-B14F-4D97-AF65-F5344CB8AC3E}">
+        <p14:creationId xmlns:p14="http://schemas.microsoft.com/office/powerpoint/2010/main" val="924048772"/>
+      </p:ext>
+    </p:extLst>
+  </p:cSld>
+  <p:clrMapOvr>
+    <a:masterClrMapping/>
+  </p:clrMapOvr>
+</p:sld>
+</file>
+
+<file path=ppt/slides/slide14.xml><?xml version="1.0" encoding="utf-8"?>
+<p:sld xmlns:a="http://schemas.openxmlformats.org/drawingml/2006/main" xmlns:r="http://schemas.openxmlformats.org/officeDocument/2006/relationships" xmlns:p="http://schemas.openxmlformats.org/presentationml/2006/main">
+  <p:cSld>
+    <p:spTree>
+      <p:nvGrpSpPr>
+        <p:cNvPr id="1" name=""/>
+        <p:cNvGrpSpPr/>
+        <p:nvPr/>
+      </p:nvGrpSpPr>
+      <p:grpSpPr>
+        <a:xfrm>
+          <a:off x="0" y="0"/>
+          <a:ext cx="0" cy="0"/>
+          <a:chOff x="0" y="0"/>
+          <a:chExt cx="0" cy="0"/>
+        </a:xfrm>
+      </p:grpSpPr>
       <p:pic>
         <p:nvPicPr>
           <p:cNvPr id="4" name="Imagem 3"/>
@@ -6912,7 +7968,107 @@
                 <a:ea typeface="+mj-ea"/>
                 <a:cs typeface="+mj-cs"/>
               </a:rPr>
-              <a:t>Gerenciamento de Tarefas:</a:t>
+              <a:t>Interrupções:</a:t>
+            </a:r>
+          </a:p>
+        </p:txBody>
+      </p:sp>
+      <p:sp>
+        <p:nvSpPr>
+          <p:cNvPr id="5" name="Espaço Reservado para Conteúdo 4"/>
+          <p:cNvSpPr>
+            <a:spLocks noGrp="1"/>
+          </p:cNvSpPr>
+          <p:nvPr>
+            <p:ph idx="1"/>
+          </p:nvPr>
+        </p:nvSpPr>
+        <p:spPr/>
+        <p:txBody>
+          <a:bodyPr/>
+          <a:lstStyle/>
+          <a:p>
+            <a:r>
+              <a:rPr lang="pt-BR" dirty="0"/>
+              <a:t>As interrupções informam ao sistema eventos externos.</a:t>
+            </a:r>
+          </a:p>
+          <a:p>
+            <a:r>
+              <a:rPr lang="pt-BR" dirty="0"/>
+              <a:t>As interrupções (ISR) acontecem fora do contexto de uma </a:t>
+            </a:r>
+            <a:r>
+              <a:rPr lang="pt-BR" dirty="0" err="1"/>
+              <a:t>task</a:t>
+            </a:r>
+            <a:r>
+              <a:rPr lang="pt-BR" dirty="0"/>
+              <a:t>.</a:t>
+            </a:r>
+          </a:p>
+          <a:p>
+            <a:r>
+              <a:rPr lang="pt-BR" dirty="0"/>
+              <a:t>Na ocorrência de uma ISR não há troca e contexto.</a:t>
+            </a:r>
+          </a:p>
+          <a:p>
+            <a:r>
+              <a:rPr lang="pt-BR" dirty="0"/>
+              <a:t>Limitações:</a:t>
+            </a:r>
+          </a:p>
+          <a:p>
+            <a:pPr lvl="1"/>
+            <a:r>
+              <a:rPr lang="pt-BR" dirty="0"/>
+              <a:t>Todas as </a:t>
+            </a:r>
+            <a:r>
+              <a:rPr lang="pt-BR" dirty="0" err="1"/>
+              <a:t>ISRs</a:t>
+            </a:r>
+            <a:r>
+              <a:rPr lang="pt-BR" dirty="0"/>
+              <a:t> compartilham a mesma “</a:t>
+            </a:r>
+            <a:r>
+              <a:rPr lang="pt-BR" dirty="0" err="1"/>
+              <a:t>stack</a:t>
+            </a:r>
+            <a:r>
+              <a:rPr lang="pt-BR" dirty="0"/>
+              <a:t>”.</a:t>
+            </a:r>
+          </a:p>
+          <a:p>
+            <a:pPr lvl="1"/>
+            <a:r>
+              <a:rPr lang="pt-BR" dirty="0"/>
+              <a:t>Uma ISR não tem um contexto que pode ser suspenso.</a:t>
+            </a:r>
+          </a:p>
+          <a:p>
+            <a:pPr lvl="1"/>
+            <a:r>
+              <a:rPr lang="pt-BR" dirty="0"/>
+              <a:t>Não pode pegar um semáforo, mas pode dar um semáforo para liberar uma </a:t>
+            </a:r>
+            <a:r>
+              <a:rPr lang="pt-BR" dirty="0" err="1"/>
+              <a:t>task</a:t>
+            </a:r>
+            <a:r>
+              <a:rPr lang="pt-BR" dirty="0"/>
+              <a:t> esperando pelo semáforo.</a:t>
+            </a:r>
+          </a:p>
+          <a:p>
+            <a:pPr lvl="1"/>
+            <a:r>
+              <a:rPr lang="pt-BR" dirty="0"/>
+              <a:t>Não pode usar uma I/O pelos drivers.</a:t>
             </a:r>
           </a:p>
         </p:txBody>
@@ -6930,7 +8086,7 @@
 </p:sld>
 </file>
 
-<file path=ppt/slides/slide14.xml><?xml version="1.0" encoding="utf-8"?>
+<file path=ppt/slides/slide15.xml><?xml version="1.0" encoding="utf-8"?>
 <p:sld xmlns:a="http://schemas.openxmlformats.org/drawingml/2006/main" xmlns:r="http://schemas.openxmlformats.org/officeDocument/2006/relationships" xmlns:p="http://schemas.openxmlformats.org/presentationml/2006/main">
   <p:cSld>
     <p:spTree>
@@ -6947,28 +8103,79 @@
           <a:chExt cx="0" cy="0"/>
         </a:xfrm>
       </p:grpSpPr>
-      <p:sp>
-        <p:nvSpPr>
-          <p:cNvPr id="2" name="Título 1"/>
-          <p:cNvSpPr>
-            <a:spLocks noGrp="1"/>
-          </p:cNvSpPr>
-          <p:nvPr>
-            <p:ph type="title"/>
-          </p:nvPr>
-        </p:nvSpPr>
-        <p:spPr/>
-        <p:txBody>
-          <a:bodyPr/>
+      <p:pic>
+        <p:nvPicPr>
+          <p:cNvPr id="4" name="Imagem 3"/>
+          <p:cNvPicPr>
+            <a:picLocks noChangeAspect="1"/>
+          </p:cNvPicPr>
+          <p:nvPr/>
+        </p:nvPicPr>
+        <p:blipFill>
+          <a:blip r:embed="rId2">
+            <a:extLst>
+              <a:ext uri="{28A0092B-C50C-407E-A947-70E740481C1C}">
+                <a14:useLocalDpi xmlns:a14="http://schemas.microsoft.com/office/drawing/2010/main" val="0"/>
+              </a:ext>
+            </a:extLst>
+          </a:blip>
+          <a:stretch>
+            <a:fillRect/>
+          </a:stretch>
+        </p:blipFill>
+        <p:spPr>
+          <a:xfrm>
+            <a:off x="295422" y="276174"/>
+            <a:ext cx="2307101" cy="1075432"/>
+          </a:xfrm>
+          <a:prstGeom prst="rect">
+            <a:avLst/>
+          </a:prstGeom>
+        </p:spPr>
+      </p:pic>
+      <p:sp>
+        <p:nvSpPr>
+          <p:cNvPr id="6" name="Retângulo 5"/>
+          <p:cNvSpPr/>
+          <p:nvPr/>
+        </p:nvSpPr>
+        <p:spPr>
+          <a:xfrm>
+            <a:off x="5938665" y="982274"/>
+            <a:ext cx="3335337" cy="369332"/>
+          </a:xfrm>
+          <a:prstGeom prst="rect">
+            <a:avLst/>
+          </a:prstGeom>
+        </p:spPr>
+        <p:txBody>
+          <a:bodyPr vert="horz" lIns="91440" tIns="45720" rIns="91440" bIns="45720" rtlCol="0" anchor="t">
+            <a:normAutofit fontScale="55000" lnSpcReduction="20000"/>
+          </a:bodyPr>
           <a:lstStyle/>
           <a:p>
-            <a:endParaRPr lang="pt-BR"/>
-          </a:p>
-        </p:txBody>
-      </p:sp>
-      <p:sp>
-        <p:nvSpPr>
-          <p:cNvPr id="3" name="Espaço Reservado para Conteúdo 2"/>
+            <a:pPr>
+              <a:spcBef>
+                <a:spcPct val="0"/>
+              </a:spcBef>
+            </a:pPr>
+            <a:r>
+              <a:rPr lang="pt-BR" sz="3600" dirty="0">
+                <a:solidFill>
+                  <a:schemeClr val="accent1"/>
+                </a:solidFill>
+                <a:latin typeface="+mj-lt"/>
+                <a:ea typeface="+mj-ea"/>
+                <a:cs typeface="+mj-cs"/>
+              </a:rPr>
+              <a:t>Código compartilhado:</a:t>
+            </a:r>
+          </a:p>
+        </p:txBody>
+      </p:sp>
+      <p:sp>
+        <p:nvSpPr>
+          <p:cNvPr id="5" name="Espaço Reservado para Conteúdo 4"/>
           <p:cNvSpPr>
             <a:spLocks noGrp="1"/>
           </p:cNvSpPr>
@@ -6978,17 +8185,640 @@
         </p:nvSpPr>
         <p:spPr/>
         <p:txBody>
-          <a:bodyPr/>
+          <a:bodyPr>
+            <a:normAutofit/>
+          </a:bodyPr>
           <a:lstStyle/>
           <a:p>
-            <a:endParaRPr lang="pt-BR"/>
+            <a:r>
+              <a:rPr lang="pt-BR" dirty="0"/>
+              <a:t>Código compartilhado por diferentes </a:t>
+            </a:r>
+            <a:r>
+              <a:rPr lang="pt-BR" dirty="0" err="1"/>
+              <a:t>task</a:t>
+            </a:r>
+            <a:r>
+              <a:rPr lang="pt-BR" dirty="0"/>
+              <a:t> deve ser reentrante.</a:t>
+            </a:r>
+          </a:p>
+          <a:p>
+            <a:pPr lvl="1"/>
+            <a:r>
+              <a:rPr lang="pt-BR" dirty="0"/>
+              <a:t>Um função chamada por diferentes </a:t>
+            </a:r>
+            <a:r>
+              <a:rPr lang="pt-BR" dirty="0" err="1"/>
+              <a:t>tasks</a:t>
+            </a:r>
+            <a:r>
+              <a:rPr lang="pt-BR" dirty="0"/>
+              <a:t>.</a:t>
+            </a:r>
+          </a:p>
+          <a:p>
+            <a:r>
+              <a:rPr lang="pt-BR" dirty="0"/>
+              <a:t>Um código é reentrante se é possível “roda-lo” concorrentemente de forma segura.</a:t>
+            </a:r>
+          </a:p>
+          <a:p>
+            <a:r>
+              <a:rPr lang="pt-BR" dirty="0"/>
+              <a:t>Para isso deve ser usada as seguintes técnicas de reentrância:</a:t>
+            </a:r>
+          </a:p>
+          <a:p>
+            <a:pPr lvl="1"/>
+            <a:r>
+              <a:rPr lang="pt-BR" dirty="0"/>
+              <a:t>Uso de variáveis dinâmicas;</a:t>
+            </a:r>
+          </a:p>
+          <a:p>
+            <a:pPr lvl="1"/>
+            <a:r>
+              <a:rPr lang="pt-BR" dirty="0"/>
+              <a:t>Variáveis globais ou estáticas guardadas por Semáforos (</a:t>
+            </a:r>
+            <a:r>
+              <a:rPr lang="pt-BR" dirty="0" err="1"/>
+              <a:t>Mutex</a:t>
+            </a:r>
+            <a:r>
+              <a:rPr lang="pt-BR" dirty="0"/>
+              <a:t>);</a:t>
+            </a:r>
+          </a:p>
+          <a:p>
+            <a:pPr lvl="1"/>
+            <a:r>
+              <a:rPr lang="pt-BR" dirty="0"/>
+              <a:t>Variáveis da </a:t>
+            </a:r>
+            <a:r>
+              <a:rPr lang="pt-BR" dirty="0" err="1"/>
+              <a:t>Task</a:t>
+            </a:r>
+            <a:r>
+              <a:rPr lang="pt-BR" dirty="0"/>
+              <a:t>( Variáveis de 4 bytes que são adicionadas no TCB).</a:t>
+            </a:r>
+          </a:p>
+          <a:p>
+            <a:pPr lvl="1"/>
+            <a:endParaRPr lang="pt-BR" dirty="0"/>
+          </a:p>
+          <a:p>
+            <a:pPr lvl="1"/>
+            <a:endParaRPr lang="pt-BR" dirty="0"/>
+          </a:p>
+          <a:p>
+            <a:pPr lvl="1"/>
+            <a:endParaRPr lang="pt-BR" dirty="0"/>
+          </a:p>
+          <a:p>
+            <a:endParaRPr lang="pt-BR" dirty="0"/>
           </a:p>
         </p:txBody>
       </p:sp>
     </p:spTree>
     <p:extLst>
       <p:ext uri="{BB962C8B-B14F-4D97-AF65-F5344CB8AC3E}">
-        <p14:creationId xmlns:p14="http://schemas.microsoft.com/office/powerpoint/2010/main" val="924048772"/>
+        <p14:creationId xmlns:p14="http://schemas.microsoft.com/office/powerpoint/2010/main" val="2414259076"/>
+      </p:ext>
+    </p:extLst>
+  </p:cSld>
+  <p:clrMapOvr>
+    <a:masterClrMapping/>
+  </p:clrMapOvr>
+</p:sld>
+</file>
+
+<file path=ppt/slides/slide16.xml><?xml version="1.0" encoding="utf-8"?>
+<p:sld xmlns:a="http://schemas.openxmlformats.org/drawingml/2006/main" xmlns:r="http://schemas.openxmlformats.org/officeDocument/2006/relationships" xmlns:p="http://schemas.openxmlformats.org/presentationml/2006/main">
+  <p:cSld>
+    <p:spTree>
+      <p:nvGrpSpPr>
+        <p:cNvPr id="1" name=""/>
+        <p:cNvGrpSpPr/>
+        <p:nvPr/>
+      </p:nvGrpSpPr>
+      <p:grpSpPr>
+        <a:xfrm>
+          <a:off x="0" y="0"/>
+          <a:ext cx="0" cy="0"/>
+          <a:chOff x="0" y="0"/>
+          <a:chExt cx="0" cy="0"/>
+        </a:xfrm>
+      </p:grpSpPr>
+      <p:pic>
+        <p:nvPicPr>
+          <p:cNvPr id="4" name="Imagem 3"/>
+          <p:cNvPicPr>
+            <a:picLocks noChangeAspect="1"/>
+          </p:cNvPicPr>
+          <p:nvPr/>
+        </p:nvPicPr>
+        <p:blipFill>
+          <a:blip r:embed="rId2">
+            <a:extLst>
+              <a:ext uri="{28A0092B-C50C-407E-A947-70E740481C1C}">
+                <a14:useLocalDpi xmlns:a14="http://schemas.microsoft.com/office/drawing/2010/main" val="0"/>
+              </a:ext>
+            </a:extLst>
+          </a:blip>
+          <a:stretch>
+            <a:fillRect/>
+          </a:stretch>
+        </p:blipFill>
+        <p:spPr>
+          <a:xfrm>
+            <a:off x="295422" y="276174"/>
+            <a:ext cx="2307101" cy="1075432"/>
+          </a:xfrm>
+          <a:prstGeom prst="rect">
+            <a:avLst/>
+          </a:prstGeom>
+        </p:spPr>
+      </p:pic>
+      <p:sp>
+        <p:nvSpPr>
+          <p:cNvPr id="6" name="Retângulo 5"/>
+          <p:cNvSpPr/>
+          <p:nvPr/>
+        </p:nvSpPr>
+        <p:spPr>
+          <a:xfrm>
+            <a:off x="5938665" y="982274"/>
+            <a:ext cx="3335337" cy="369332"/>
+          </a:xfrm>
+          <a:prstGeom prst="rect">
+            <a:avLst/>
+          </a:prstGeom>
+        </p:spPr>
+        <p:txBody>
+          <a:bodyPr vert="horz" lIns="91440" tIns="45720" rIns="91440" bIns="45720" rtlCol="0" anchor="t">
+            <a:normAutofit fontScale="47500" lnSpcReduction="20000"/>
+          </a:bodyPr>
+          <a:lstStyle/>
+          <a:p>
+            <a:pPr>
+              <a:spcBef>
+                <a:spcPct val="0"/>
+              </a:spcBef>
+            </a:pPr>
+            <a:r>
+              <a:rPr lang="pt-BR" sz="3600" dirty="0">
+                <a:solidFill>
+                  <a:schemeClr val="accent1"/>
+                </a:solidFill>
+                <a:latin typeface="+mj-lt"/>
+                <a:ea typeface="+mj-ea"/>
+                <a:cs typeface="+mj-cs"/>
+              </a:rPr>
+              <a:t>Comunicação entre </a:t>
+            </a:r>
+            <a:r>
+              <a:rPr lang="pt-BR" sz="3600" dirty="0" err="1">
+                <a:solidFill>
+                  <a:schemeClr val="accent1"/>
+                </a:solidFill>
+                <a:latin typeface="+mj-lt"/>
+                <a:ea typeface="+mj-ea"/>
+                <a:cs typeface="+mj-cs"/>
+              </a:rPr>
+              <a:t>tasks</a:t>
+            </a:r>
+            <a:r>
+              <a:rPr lang="pt-BR" sz="3600" dirty="0">
+                <a:solidFill>
+                  <a:schemeClr val="accent1"/>
+                </a:solidFill>
+                <a:latin typeface="+mj-lt"/>
+                <a:ea typeface="+mj-ea"/>
+                <a:cs typeface="+mj-cs"/>
+              </a:rPr>
+              <a:t> (ITC):</a:t>
+            </a:r>
+          </a:p>
+        </p:txBody>
+      </p:sp>
+      <p:sp>
+        <p:nvSpPr>
+          <p:cNvPr id="5" name="Espaço Reservado para Conteúdo 4"/>
+          <p:cNvSpPr>
+            <a:spLocks noGrp="1"/>
+          </p:cNvSpPr>
+          <p:nvPr>
+            <p:ph idx="1"/>
+          </p:nvPr>
+        </p:nvSpPr>
+        <p:spPr/>
+        <p:txBody>
+          <a:bodyPr>
+            <a:normAutofit lnSpcReduction="10000"/>
+          </a:bodyPr>
+          <a:lstStyle/>
+          <a:p>
+            <a:r>
+              <a:rPr lang="pt-BR" dirty="0" err="1"/>
+              <a:t>Shared</a:t>
+            </a:r>
+            <a:r>
+              <a:rPr lang="pt-BR" dirty="0"/>
+              <a:t> </a:t>
+            </a:r>
+            <a:r>
+              <a:rPr lang="pt-BR" dirty="0" err="1"/>
+              <a:t>memory</a:t>
+            </a:r>
+            <a:r>
+              <a:rPr lang="pt-BR" dirty="0"/>
+              <a:t>, for </a:t>
+            </a:r>
+            <a:r>
+              <a:rPr lang="pt-BR" dirty="0" err="1"/>
+              <a:t>simple</a:t>
+            </a:r>
+            <a:r>
+              <a:rPr lang="pt-BR" dirty="0"/>
+              <a:t> </a:t>
+            </a:r>
+            <a:r>
+              <a:rPr lang="pt-BR" dirty="0" err="1"/>
+              <a:t>sharing</a:t>
+            </a:r>
+            <a:r>
+              <a:rPr lang="pt-BR" dirty="0"/>
+              <a:t> </a:t>
+            </a:r>
+            <a:r>
+              <a:rPr lang="pt-BR" dirty="0" err="1"/>
+              <a:t>of</a:t>
+            </a:r>
+            <a:r>
+              <a:rPr lang="pt-BR" dirty="0"/>
+              <a:t> data. </a:t>
+            </a:r>
+          </a:p>
+          <a:p>
+            <a:r>
+              <a:rPr lang="pt-BR" dirty="0" err="1"/>
+              <a:t>Semaphores</a:t>
+            </a:r>
+            <a:r>
+              <a:rPr lang="pt-BR" dirty="0"/>
+              <a:t>, for </a:t>
+            </a:r>
+            <a:r>
+              <a:rPr lang="pt-BR" dirty="0" err="1"/>
+              <a:t>basic</a:t>
+            </a:r>
+            <a:r>
+              <a:rPr lang="pt-BR" dirty="0"/>
+              <a:t> mutual </a:t>
+            </a:r>
+            <a:r>
+              <a:rPr lang="pt-BR" dirty="0" err="1"/>
+              <a:t>exclusion</a:t>
+            </a:r>
+            <a:r>
+              <a:rPr lang="pt-BR" dirty="0"/>
+              <a:t> </a:t>
+            </a:r>
+            <a:r>
+              <a:rPr lang="pt-BR" dirty="0" err="1"/>
+              <a:t>and</a:t>
+            </a:r>
+            <a:r>
+              <a:rPr lang="pt-BR" dirty="0"/>
+              <a:t> </a:t>
+            </a:r>
+            <a:r>
+              <a:rPr lang="pt-BR" dirty="0" err="1"/>
+              <a:t>synchronization</a:t>
+            </a:r>
+            <a:r>
+              <a:rPr lang="pt-BR" dirty="0"/>
+              <a:t>. </a:t>
+            </a:r>
+          </a:p>
+          <a:p>
+            <a:r>
+              <a:rPr lang="pt-BR" dirty="0" err="1"/>
+              <a:t>Mutexes</a:t>
+            </a:r>
+            <a:r>
+              <a:rPr lang="pt-BR" dirty="0"/>
+              <a:t> </a:t>
+            </a:r>
+            <a:r>
+              <a:rPr lang="pt-BR" dirty="0" err="1"/>
+              <a:t>and</a:t>
+            </a:r>
+            <a:r>
+              <a:rPr lang="pt-BR" dirty="0"/>
+              <a:t> </a:t>
+            </a:r>
+            <a:r>
+              <a:rPr lang="pt-BR" dirty="0" err="1"/>
+              <a:t>condition</a:t>
+            </a:r>
+            <a:r>
+              <a:rPr lang="pt-BR" dirty="0"/>
+              <a:t> </a:t>
+            </a:r>
+            <a:r>
+              <a:rPr lang="pt-BR" dirty="0" err="1"/>
+              <a:t>variables</a:t>
+            </a:r>
+            <a:r>
+              <a:rPr lang="pt-BR" dirty="0"/>
+              <a:t> for mutual </a:t>
+            </a:r>
+            <a:r>
+              <a:rPr lang="pt-BR" dirty="0" err="1"/>
+              <a:t>exclusion</a:t>
+            </a:r>
+            <a:r>
+              <a:rPr lang="pt-BR" dirty="0"/>
+              <a:t> </a:t>
+            </a:r>
+            <a:r>
+              <a:rPr lang="pt-BR" dirty="0" err="1"/>
+              <a:t>and</a:t>
+            </a:r>
+            <a:r>
+              <a:rPr lang="pt-BR" dirty="0"/>
+              <a:t> </a:t>
+            </a:r>
+            <a:r>
+              <a:rPr lang="pt-BR" dirty="0" err="1"/>
+              <a:t>synchronization</a:t>
+            </a:r>
+            <a:r>
+              <a:rPr lang="pt-BR" dirty="0"/>
+              <a:t> </a:t>
+            </a:r>
+            <a:r>
+              <a:rPr lang="pt-BR" dirty="0" err="1"/>
+              <a:t>using</a:t>
+            </a:r>
+            <a:r>
+              <a:rPr lang="pt-BR" dirty="0"/>
+              <a:t> POSIX interfaces. </a:t>
+            </a:r>
+          </a:p>
+          <a:p>
+            <a:r>
+              <a:rPr lang="pt-BR" dirty="0" err="1"/>
+              <a:t>Message</a:t>
+            </a:r>
+            <a:r>
+              <a:rPr lang="pt-BR" dirty="0"/>
+              <a:t> </a:t>
+            </a:r>
+            <a:r>
+              <a:rPr lang="pt-BR" dirty="0" err="1"/>
+              <a:t>queues</a:t>
+            </a:r>
+            <a:r>
+              <a:rPr lang="pt-BR" dirty="0"/>
+              <a:t> </a:t>
+            </a:r>
+            <a:r>
+              <a:rPr lang="pt-BR" dirty="0" err="1"/>
+              <a:t>and</a:t>
+            </a:r>
+            <a:r>
+              <a:rPr lang="pt-BR" dirty="0"/>
+              <a:t> </a:t>
+            </a:r>
+            <a:r>
+              <a:rPr lang="pt-BR" dirty="0" err="1"/>
+              <a:t>pipes</a:t>
+            </a:r>
+            <a:r>
+              <a:rPr lang="pt-BR" dirty="0"/>
+              <a:t>, for </a:t>
+            </a:r>
+            <a:r>
+              <a:rPr lang="pt-BR" dirty="0" err="1"/>
+              <a:t>intertask</a:t>
+            </a:r>
+            <a:r>
+              <a:rPr lang="pt-BR" dirty="0"/>
+              <a:t> </a:t>
+            </a:r>
+            <a:r>
+              <a:rPr lang="pt-BR" dirty="0" err="1"/>
+              <a:t>message</a:t>
+            </a:r>
+            <a:r>
+              <a:rPr lang="pt-BR" dirty="0"/>
+              <a:t> </a:t>
+            </a:r>
+            <a:r>
+              <a:rPr lang="pt-BR" dirty="0" err="1"/>
+              <a:t>passing</a:t>
+            </a:r>
+            <a:r>
+              <a:rPr lang="pt-BR" dirty="0"/>
+              <a:t> </a:t>
+            </a:r>
+            <a:r>
+              <a:rPr lang="pt-BR" dirty="0" err="1"/>
+              <a:t>within</a:t>
+            </a:r>
+            <a:r>
+              <a:rPr lang="pt-BR" dirty="0"/>
+              <a:t> a CPU.</a:t>
+            </a:r>
+          </a:p>
+          <a:p>
+            <a:r>
+              <a:rPr lang="pt-BR" dirty="0" err="1"/>
+              <a:t>VxWorks</a:t>
+            </a:r>
+            <a:r>
+              <a:rPr lang="pt-BR" dirty="0"/>
+              <a:t> </a:t>
+            </a:r>
+            <a:r>
+              <a:rPr lang="pt-BR" dirty="0" err="1"/>
+              <a:t>events</a:t>
+            </a:r>
+            <a:r>
+              <a:rPr lang="pt-BR" dirty="0"/>
+              <a:t>, for communication </a:t>
+            </a:r>
+            <a:r>
+              <a:rPr lang="pt-BR" dirty="0" err="1"/>
+              <a:t>and</a:t>
+            </a:r>
+            <a:r>
+              <a:rPr lang="pt-BR" dirty="0"/>
+              <a:t> </a:t>
+            </a:r>
+            <a:r>
+              <a:rPr lang="pt-BR" dirty="0" err="1"/>
+              <a:t>synchronization</a:t>
+            </a:r>
+            <a:r>
+              <a:rPr lang="pt-BR" dirty="0"/>
+              <a:t>. </a:t>
+            </a:r>
+          </a:p>
+          <a:p>
+            <a:r>
+              <a:rPr lang="pt-BR" dirty="0" err="1"/>
+              <a:t>Message</a:t>
+            </a:r>
+            <a:r>
+              <a:rPr lang="pt-BR" dirty="0"/>
+              <a:t> </a:t>
+            </a:r>
+            <a:r>
+              <a:rPr lang="pt-BR" dirty="0" err="1"/>
+              <a:t>channels</a:t>
+            </a:r>
+            <a:r>
+              <a:rPr lang="pt-BR" dirty="0"/>
+              <a:t>, for socket-</a:t>
+            </a:r>
+            <a:r>
+              <a:rPr lang="pt-BR" dirty="0" err="1"/>
+              <a:t>based</a:t>
+            </a:r>
+            <a:r>
+              <a:rPr lang="pt-BR" dirty="0"/>
+              <a:t> </a:t>
+            </a:r>
+            <a:r>
+              <a:rPr lang="pt-BR" dirty="0" err="1"/>
+              <a:t>interprocess</a:t>
+            </a:r>
+            <a:r>
+              <a:rPr lang="pt-BR" dirty="0"/>
+              <a:t> communication. </a:t>
+            </a:r>
+          </a:p>
+          <a:p>
+            <a:r>
+              <a:rPr lang="pt-BR" dirty="0"/>
+              <a:t>Sockets </a:t>
+            </a:r>
+            <a:r>
+              <a:rPr lang="pt-BR" dirty="0" err="1"/>
+              <a:t>and</a:t>
+            </a:r>
+            <a:r>
+              <a:rPr lang="pt-BR" dirty="0"/>
+              <a:t> </a:t>
+            </a:r>
+            <a:r>
+              <a:rPr lang="pt-BR" dirty="0" err="1"/>
+              <a:t>remote</a:t>
+            </a:r>
+            <a:r>
+              <a:rPr lang="pt-BR" dirty="0"/>
+              <a:t> procedure </a:t>
+            </a:r>
+            <a:r>
+              <a:rPr lang="pt-BR" dirty="0" err="1"/>
+              <a:t>calls</a:t>
+            </a:r>
+            <a:r>
+              <a:rPr lang="pt-BR" dirty="0"/>
+              <a:t>, for network-</a:t>
+            </a:r>
+            <a:r>
+              <a:rPr lang="pt-BR" dirty="0" err="1"/>
+              <a:t>transparent</a:t>
+            </a:r>
+            <a:r>
+              <a:rPr lang="pt-BR" dirty="0"/>
+              <a:t> </a:t>
+            </a:r>
+            <a:r>
+              <a:rPr lang="pt-BR" dirty="0" err="1"/>
+              <a:t>intertask</a:t>
+            </a:r>
+            <a:r>
+              <a:rPr lang="pt-BR" dirty="0"/>
+              <a:t> communication. </a:t>
+            </a:r>
+          </a:p>
+          <a:p>
+            <a:r>
+              <a:rPr lang="pt-BR" dirty="0" err="1"/>
+              <a:t>Signals</a:t>
+            </a:r>
+            <a:r>
+              <a:rPr lang="pt-BR" dirty="0"/>
+              <a:t>, for </a:t>
+            </a:r>
+            <a:r>
+              <a:rPr lang="pt-BR" dirty="0" err="1"/>
+              <a:t>exception</a:t>
+            </a:r>
+            <a:r>
+              <a:rPr lang="pt-BR" dirty="0"/>
+              <a:t> </a:t>
+            </a:r>
+            <a:r>
+              <a:rPr lang="pt-BR" dirty="0" err="1"/>
+              <a:t>handling</a:t>
+            </a:r>
+            <a:r>
+              <a:rPr lang="pt-BR" dirty="0"/>
+              <a:t>, </a:t>
+            </a:r>
+            <a:r>
+              <a:rPr lang="pt-BR" dirty="0" err="1"/>
+              <a:t>interprocess</a:t>
+            </a:r>
+            <a:r>
+              <a:rPr lang="pt-BR" dirty="0"/>
+              <a:t> communication, </a:t>
+            </a:r>
+            <a:r>
+              <a:rPr lang="pt-BR" dirty="0" err="1"/>
+              <a:t>and</a:t>
+            </a:r>
+            <a:r>
+              <a:rPr lang="pt-BR" dirty="0"/>
+              <a:t> </a:t>
+            </a:r>
+            <a:r>
+              <a:rPr lang="pt-BR" dirty="0" err="1"/>
+              <a:t>process</a:t>
+            </a:r>
+            <a:r>
+              <a:rPr lang="pt-BR" dirty="0"/>
+              <a:t> management.</a:t>
+            </a:r>
+          </a:p>
+          <a:p>
+            <a:pPr lvl="1"/>
+            <a:endParaRPr lang="pt-BR" dirty="0"/>
+          </a:p>
+          <a:p>
+            <a:pPr lvl="1"/>
+            <a:endParaRPr lang="pt-BR" dirty="0"/>
+          </a:p>
+          <a:p>
+            <a:endParaRPr lang="pt-BR" dirty="0"/>
+          </a:p>
+        </p:txBody>
+      </p:sp>
+    </p:spTree>
+    <p:extLst>
+      <p:ext uri="{BB962C8B-B14F-4D97-AF65-F5344CB8AC3E}">
+        <p14:creationId xmlns:p14="http://schemas.microsoft.com/office/powerpoint/2010/main" val="144814980"/>
       </p:ext>
     </p:extLst>
   </p:cSld>
@@ -7472,7 +9302,6 @@
               <a:rPr lang="pt-BR" dirty="0"/>
               <a:t>BMW</a:t>
             </a:r>
-            <a:endParaRPr lang="pt-BR" dirty="0"/>
           </a:p>
           <a:p>
             <a:pPr lvl="1"/>
@@ -7746,7 +9575,7 @@
         </p:spPr>
         <p:txBody>
           <a:bodyPr vert="horz" lIns="91440" tIns="45720" rIns="91440" bIns="45720" rtlCol="0">
-            <a:normAutofit fontScale="92500"/>
+            <a:normAutofit fontScale="85000" lnSpcReduction="10000"/>
           </a:bodyPr>
           <a:lstStyle>
             <a:lvl1pPr marL="342900" indent="-342900">
@@ -8658,15 +10487,7 @@
             </a:r>
             <a:r>
               <a:rPr lang="pt-BR" dirty="0"/>
-              <a:t>, incluindo ARM®, Intel</a:t>
-            </a:r>
-            <a:r>
-              <a:rPr lang="pt-BR" dirty="0"/>
-              <a:t> ®,</a:t>
-            </a:r>
-            <a:r>
-              <a:rPr lang="pt-BR" dirty="0"/>
-              <a:t> e Power </a:t>
+              <a:t>, incluindo ARM®, Intel ®, e Power </a:t>
             </a:r>
             <a:r>
               <a:rPr lang="pt-BR" dirty="0" err="1"/>
@@ -8674,11 +10495,7 @@
             </a:r>
             <a:r>
               <a:rPr lang="pt-BR" dirty="0"/>
-              <a:t>®</a:t>
-            </a:r>
-            <a:r>
-              <a:rPr lang="pt-BR" dirty="0"/>
-              <a:t>.</a:t>
+              <a:t>®.</a:t>
             </a:r>
           </a:p>
           <a:p>
@@ -8928,15 +10745,7 @@
             </a:r>
             <a:r>
               <a:rPr lang="pt-BR" sz="2000" dirty="0"/>
-              <a:t> é o “</a:t>
-            </a:r>
-            <a:r>
-              <a:rPr lang="pt-BR" sz="2000" dirty="0" err="1"/>
-              <a:t>wind</a:t>
-            </a:r>
-            <a:r>
-              <a:rPr lang="pt-BR" sz="2000" dirty="0"/>
-              <a:t> </a:t>
+              <a:t> é o “Wind </a:t>
             </a:r>
             <a:r>
               <a:rPr lang="pt-BR" sz="2000" dirty="0" err="1"/>
@@ -8998,15 +10807,7 @@
           <a:p>
             <a:r>
               <a:rPr lang="pt-BR" sz="2000" dirty="0"/>
-              <a:t>Cada  modulo individual também é </a:t>
-            </a:r>
-            <a:r>
-              <a:rPr lang="pt-BR" sz="2000" dirty="0" err="1"/>
-              <a:t>escalavel</a:t>
-            </a:r>
-            <a:r>
-              <a:rPr lang="pt-BR" sz="2000" dirty="0"/>
-              <a:t>, podendo se retirar funções individuais da </a:t>
+              <a:t>Cada  modulo individual também é escalável, podendo se retirar funções individuais da </a:t>
             </a:r>
             <a:r>
               <a:rPr lang="pt-BR" sz="2000" dirty="0" err="1"/>

</xml_diff>